<commit_message>
Finalisation de la documentation + ajout des derniers commentaires dans le code de l'application + continuation de la préparation de la présentation de la semaine COM
</commit_message>
<xml_diff>
--- a/Presentation Pyramid.pptx
+++ b/Presentation Pyramid.pptx
@@ -11,6 +11,7 @@
     <p:sldId id="259" r:id="rId5"/>
     <p:sldId id="260" r:id="rId6"/>
     <p:sldId id="261" r:id="rId7"/>
+    <p:sldId id="263" r:id="rId8"/>
   </p:sldIdLst>
   <p:sldSz cx="12192000" cy="6858000"/>
   <p:notesSz cx="6858000" cy="9144000"/>
@@ -109,6 +110,11 @@
       </a:defRPr>
     </a:lvl9pPr>
   </p:defaultTextStyle>
+  <p:extLst>
+    <p:ext uri="{EFAFB233-063F-42B5-8137-9DF3F51BA10A}">
+      <p15:sldGuideLst xmlns:p15="http://schemas.microsoft.com/office/powerpoint/2012/main"/>
+    </p:ext>
+  </p:extLst>
 </p:presentation>
 </file>
 
@@ -162,7 +168,7 @@
           <a:noFill/>
           <a:extLst>
             <a:ext uri="{909E8E84-426E-40dd-AFC4-6F175D3DCCD1}">
-              <a14:hiddenFill xmlns:a14="http://schemas.microsoft.com/office/drawing/2010/main" xmlns="">
+              <a14:hiddenFill xmlns="" xmlns:a14="http://schemas.microsoft.com/office/drawing/2010/main">
                 <a:solidFill>
                   <a:srgbClr val="FFFFFF"/>
                 </a:solidFill>
@@ -222,7 +228,7 @@
             </a:ln>
             <a:extLst>
               <a:ext uri="{91240B29-F687-4f45-9708-019B960494DF}">
-                <a14:hiddenLine xmlns:a14="http://schemas.microsoft.com/office/drawing/2010/main" xmlns="" w="9525">
+                <a14:hiddenLine xmlns="" xmlns:a14="http://schemas.microsoft.com/office/drawing/2010/main" w="9525">
                   <a:solidFill>
                     <a:srgbClr val="000000"/>
                   </a:solidFill>
@@ -312,7 +318,7 @@
             </a:ln>
             <a:extLst>
               <a:ext uri="{91240B29-F687-4f45-9708-019B960494DF}">
-                <a14:hiddenLine xmlns:a14="http://schemas.microsoft.com/office/drawing/2010/main" xmlns="" w="9525">
+                <a14:hiddenLine xmlns="" xmlns:a14="http://schemas.microsoft.com/office/drawing/2010/main" w="9525">
                   <a:solidFill>
                     <a:srgbClr val="000000"/>
                   </a:solidFill>
@@ -402,7 +408,7 @@
             </a:ln>
             <a:extLst>
               <a:ext uri="{91240B29-F687-4f45-9708-019B960494DF}">
-                <a14:hiddenLine xmlns:a14="http://schemas.microsoft.com/office/drawing/2010/main" xmlns="" w="9525">
+                <a14:hiddenLine xmlns="" xmlns:a14="http://schemas.microsoft.com/office/drawing/2010/main" w="9525">
                   <a:solidFill>
                     <a:srgbClr val="000000"/>
                   </a:solidFill>
@@ -436,7 +442,7 @@
             </a:ln>
             <a:extLst>
               <a:ext uri="{91240B29-F687-4f45-9708-019B960494DF}">
-                <a14:hiddenLine xmlns:a14="http://schemas.microsoft.com/office/drawing/2010/main" xmlns="" w="9525">
+                <a14:hiddenLine xmlns="" xmlns:a14="http://schemas.microsoft.com/office/drawing/2010/main" w="9525">
                   <a:solidFill>
                     <a:srgbClr val="000000"/>
                   </a:solidFill>
@@ -526,7 +532,7 @@
             </a:ln>
             <a:extLst>
               <a:ext uri="{91240B29-F687-4f45-9708-019B960494DF}">
-                <a14:hiddenLine xmlns:a14="http://schemas.microsoft.com/office/drawing/2010/main" xmlns="" w="9525">
+                <a14:hiddenLine xmlns="" xmlns:a14="http://schemas.microsoft.com/office/drawing/2010/main" w="9525">
                   <a:solidFill>
                     <a:srgbClr val="000000"/>
                   </a:solidFill>
@@ -588,7 +594,7 @@
             </a:ln>
             <a:extLst>
               <a:ext uri="{91240B29-F687-4f45-9708-019B960494DF}">
-                <a14:hiddenLine xmlns:a14="http://schemas.microsoft.com/office/drawing/2010/main" xmlns="" w="9525">
+                <a14:hiddenLine xmlns="" xmlns:a14="http://schemas.microsoft.com/office/drawing/2010/main" w="9525">
                   <a:solidFill>
                     <a:srgbClr val="000000"/>
                   </a:solidFill>
@@ -650,7 +656,7 @@
             </a:ln>
             <a:extLst>
               <a:ext uri="{91240B29-F687-4f45-9708-019B960494DF}">
-                <a14:hiddenLine xmlns:a14="http://schemas.microsoft.com/office/drawing/2010/main" xmlns="" w="9525">
+                <a14:hiddenLine xmlns="" xmlns:a14="http://schemas.microsoft.com/office/drawing/2010/main" w="9525">
                   <a:solidFill>
                     <a:srgbClr val="000000"/>
                   </a:solidFill>
@@ -740,7 +746,7 @@
             </a:ln>
             <a:extLst>
               <a:ext uri="{91240B29-F687-4f45-9708-019B960494DF}">
-                <a14:hiddenLine xmlns:a14="http://schemas.microsoft.com/office/drawing/2010/main" xmlns="" w="9525">
+                <a14:hiddenLine xmlns="" xmlns:a14="http://schemas.microsoft.com/office/drawing/2010/main" w="9525">
                   <a:solidFill>
                     <a:srgbClr val="000000"/>
                   </a:solidFill>
@@ -802,7 +808,7 @@
             </a:ln>
             <a:extLst>
               <a:ext uri="{91240B29-F687-4f45-9708-019B960494DF}">
-                <a14:hiddenLine xmlns:a14="http://schemas.microsoft.com/office/drawing/2010/main" xmlns="" w="9525">
+                <a14:hiddenLine xmlns="" xmlns:a14="http://schemas.microsoft.com/office/drawing/2010/main" w="9525">
                   <a:solidFill>
                     <a:srgbClr val="000000"/>
                   </a:solidFill>
@@ -864,7 +870,7 @@
             </a:ln>
             <a:extLst>
               <a:ext uri="{91240B29-F687-4f45-9708-019B960494DF}">
-                <a14:hiddenLine xmlns:a14="http://schemas.microsoft.com/office/drawing/2010/main" xmlns="" w="9525">
+                <a14:hiddenLine xmlns="" xmlns:a14="http://schemas.microsoft.com/office/drawing/2010/main" w="9525">
                   <a:solidFill>
                     <a:srgbClr val="000000"/>
                   </a:solidFill>
@@ -954,7 +960,7 @@
             </a:ln>
             <a:extLst>
               <a:ext uri="{91240B29-F687-4f45-9708-019B960494DF}">
-                <a14:hiddenLine xmlns:a14="http://schemas.microsoft.com/office/drawing/2010/main" xmlns="" w="9525">
+                <a14:hiddenLine xmlns="" xmlns:a14="http://schemas.microsoft.com/office/drawing/2010/main" w="9525">
                   <a:solidFill>
                     <a:srgbClr val="000000"/>
                   </a:solidFill>
@@ -1044,7 +1050,7 @@
             </a:ln>
             <a:extLst>
               <a:ext uri="{91240B29-F687-4f45-9708-019B960494DF}">
-                <a14:hiddenLine xmlns:a14="http://schemas.microsoft.com/office/drawing/2010/main" xmlns="" w="9525">
+                <a14:hiddenLine xmlns="" xmlns:a14="http://schemas.microsoft.com/office/drawing/2010/main" w="9525">
                   <a:solidFill>
                     <a:srgbClr val="000000"/>
                   </a:solidFill>
@@ -1106,7 +1112,7 @@
             </a:ln>
             <a:extLst>
               <a:ext uri="{91240B29-F687-4f45-9708-019B960494DF}">
-                <a14:hiddenLine xmlns:a14="http://schemas.microsoft.com/office/drawing/2010/main" xmlns="" w="9525">
+                <a14:hiddenLine xmlns="" xmlns:a14="http://schemas.microsoft.com/office/drawing/2010/main" w="9525">
                   <a:solidFill>
                     <a:srgbClr val="000000"/>
                   </a:solidFill>
@@ -1216,7 +1222,7 @@
             </a:ln>
             <a:extLst>
               <a:ext uri="{91240B29-F687-4f45-9708-019B960494DF}">
-                <a14:hiddenLine xmlns:a14="http://schemas.microsoft.com/office/drawing/2010/main" xmlns="" w="9525">
+                <a14:hiddenLine xmlns="" xmlns:a14="http://schemas.microsoft.com/office/drawing/2010/main" w="9525">
                   <a:solidFill>
                     <a:srgbClr val="000000"/>
                   </a:solidFill>
@@ -1278,7 +1284,7 @@
             </a:ln>
             <a:extLst>
               <a:ext uri="{91240B29-F687-4f45-9708-019B960494DF}">
-                <a14:hiddenLine xmlns:a14="http://schemas.microsoft.com/office/drawing/2010/main" xmlns="" w="9525">
+                <a14:hiddenLine xmlns="" xmlns:a14="http://schemas.microsoft.com/office/drawing/2010/main" w="9525">
                   <a:solidFill>
                     <a:srgbClr val="000000"/>
                   </a:solidFill>
@@ -1368,7 +1374,7 @@
             </a:ln>
             <a:extLst>
               <a:ext uri="{91240B29-F687-4f45-9708-019B960494DF}">
-                <a14:hiddenLine xmlns:a14="http://schemas.microsoft.com/office/drawing/2010/main" xmlns="" w="9525">
+                <a14:hiddenLine xmlns="" xmlns:a14="http://schemas.microsoft.com/office/drawing/2010/main" w="9525">
                   <a:solidFill>
                     <a:srgbClr val="000000"/>
                   </a:solidFill>
@@ -1458,7 +1464,7 @@
             </a:ln>
             <a:extLst>
               <a:ext uri="{91240B29-F687-4f45-9708-019B960494DF}">
-                <a14:hiddenLine xmlns:a14="http://schemas.microsoft.com/office/drawing/2010/main" xmlns="" w="9525">
+                <a14:hiddenLine xmlns="" xmlns:a14="http://schemas.microsoft.com/office/drawing/2010/main" w="9525">
                   <a:solidFill>
                     <a:srgbClr val="000000"/>
                   </a:solidFill>
@@ -1520,7 +1526,7 @@
             </a:ln>
             <a:extLst>
               <a:ext uri="{91240B29-F687-4f45-9708-019B960494DF}">
-                <a14:hiddenLine xmlns:a14="http://schemas.microsoft.com/office/drawing/2010/main" xmlns="" w="9525">
+                <a14:hiddenLine xmlns="" xmlns:a14="http://schemas.microsoft.com/office/drawing/2010/main" w="9525">
                   <a:solidFill>
                     <a:srgbClr val="000000"/>
                   </a:solidFill>
@@ -1610,7 +1616,7 @@
             </a:ln>
             <a:extLst>
               <a:ext uri="{91240B29-F687-4f45-9708-019B960494DF}">
-                <a14:hiddenLine xmlns:a14="http://schemas.microsoft.com/office/drawing/2010/main" xmlns="" w="9525">
+                <a14:hiddenLine xmlns="" xmlns:a14="http://schemas.microsoft.com/office/drawing/2010/main" w="9525">
                   <a:solidFill>
                     <a:srgbClr val="000000"/>
                   </a:solidFill>
@@ -1700,7 +1706,7 @@
             </a:ln>
             <a:extLst>
               <a:ext uri="{91240B29-F687-4f45-9708-019B960494DF}">
-                <a14:hiddenLine xmlns:a14="http://schemas.microsoft.com/office/drawing/2010/main" xmlns="" w="9525">
+                <a14:hiddenLine xmlns="" xmlns:a14="http://schemas.microsoft.com/office/drawing/2010/main" w="9525">
                   <a:solidFill>
                     <a:srgbClr val="000000"/>
                   </a:solidFill>
@@ -1756,7 +1762,7 @@
             </a:ln>
             <a:extLst>
               <a:ext uri="{91240B29-F687-4f45-9708-019B960494DF}">
-                <a14:hiddenLine xmlns:a14="http://schemas.microsoft.com/office/drawing/2010/main" xmlns="" w="9525">
+                <a14:hiddenLine xmlns="" xmlns:a14="http://schemas.microsoft.com/office/drawing/2010/main" w="9525">
                   <a:solidFill>
                     <a:srgbClr val="000000"/>
                   </a:solidFill>
@@ -1846,7 +1852,7 @@
             </a:ln>
             <a:extLst>
               <a:ext uri="{91240B29-F687-4f45-9708-019B960494DF}">
-                <a14:hiddenLine xmlns:a14="http://schemas.microsoft.com/office/drawing/2010/main" xmlns="" w="9525">
+                <a14:hiddenLine xmlns="" xmlns:a14="http://schemas.microsoft.com/office/drawing/2010/main" w="9525">
                   <a:solidFill>
                     <a:srgbClr val="000000"/>
                   </a:solidFill>
@@ -1902,7 +1908,7 @@
             </a:ln>
             <a:extLst>
               <a:ext uri="{91240B29-F687-4f45-9708-019B960494DF}">
-                <a14:hiddenLine xmlns:a14="http://schemas.microsoft.com/office/drawing/2010/main" xmlns="" w="9525">
+                <a14:hiddenLine xmlns="" xmlns:a14="http://schemas.microsoft.com/office/drawing/2010/main" w="9525">
                   <a:solidFill>
                     <a:srgbClr val="000000"/>
                   </a:solidFill>
@@ -1992,7 +1998,7 @@
             </a:ln>
             <a:extLst>
               <a:ext uri="{91240B29-F687-4f45-9708-019B960494DF}">
-                <a14:hiddenLine xmlns:a14="http://schemas.microsoft.com/office/drawing/2010/main" xmlns="" w="9525">
+                <a14:hiddenLine xmlns="" xmlns:a14="http://schemas.microsoft.com/office/drawing/2010/main" w="9525">
                   <a:solidFill>
                     <a:srgbClr val="000000"/>
                   </a:solidFill>
@@ -2060,7 +2066,7 @@
             </a:ln>
             <a:extLst>
               <a:ext uri="{91240B29-F687-4f45-9708-019B960494DF}">
-                <a14:hiddenLine xmlns:a14="http://schemas.microsoft.com/office/drawing/2010/main" xmlns="" w="9525">
+                <a14:hiddenLine xmlns="" xmlns:a14="http://schemas.microsoft.com/office/drawing/2010/main" w="9525">
                   <a:solidFill>
                     <a:srgbClr val="000000"/>
                   </a:solidFill>
@@ -2150,7 +2156,7 @@
             </a:ln>
             <a:extLst>
               <a:ext uri="{91240B29-F687-4f45-9708-019B960494DF}">
-                <a14:hiddenLine xmlns:a14="http://schemas.microsoft.com/office/drawing/2010/main" xmlns="" w="9525">
+                <a14:hiddenLine xmlns="" xmlns:a14="http://schemas.microsoft.com/office/drawing/2010/main" w="9525">
                   <a:solidFill>
                     <a:srgbClr val="000000"/>
                   </a:solidFill>
@@ -2218,7 +2224,7 @@
             </a:ln>
             <a:extLst>
               <a:ext uri="{91240B29-F687-4f45-9708-019B960494DF}">
-                <a14:hiddenLine xmlns:a14="http://schemas.microsoft.com/office/drawing/2010/main" xmlns="" w="9525">
+                <a14:hiddenLine xmlns="" xmlns:a14="http://schemas.microsoft.com/office/drawing/2010/main" w="9525">
                   <a:solidFill>
                     <a:srgbClr val="000000"/>
                   </a:solidFill>
@@ -2308,7 +2314,7 @@
             </a:ln>
             <a:extLst>
               <a:ext uri="{91240B29-F687-4f45-9708-019B960494DF}">
-                <a14:hiddenLine xmlns:a14="http://schemas.microsoft.com/office/drawing/2010/main" xmlns="" w="9525">
+                <a14:hiddenLine xmlns="" xmlns:a14="http://schemas.microsoft.com/office/drawing/2010/main" w="9525">
                   <a:solidFill>
                     <a:srgbClr val="000000"/>
                   </a:solidFill>
@@ -2342,7 +2348,7 @@
             </a:ln>
             <a:extLst>
               <a:ext uri="{91240B29-F687-4f45-9708-019B960494DF}">
-                <a14:hiddenLine xmlns:a14="http://schemas.microsoft.com/office/drawing/2010/main" xmlns="" w="9525">
+                <a14:hiddenLine xmlns="" xmlns:a14="http://schemas.microsoft.com/office/drawing/2010/main" w="9525">
                   <a:solidFill>
                     <a:srgbClr val="000000"/>
                   </a:solidFill>
@@ -2432,7 +2438,7 @@
             </a:ln>
             <a:extLst>
               <a:ext uri="{91240B29-F687-4f45-9708-019B960494DF}">
-                <a14:hiddenLine xmlns:a14="http://schemas.microsoft.com/office/drawing/2010/main" xmlns="" w="9525">
+                <a14:hiddenLine xmlns="" xmlns:a14="http://schemas.microsoft.com/office/drawing/2010/main" w="9525">
                   <a:solidFill>
                     <a:srgbClr val="000000"/>
                   </a:solidFill>
@@ -2494,7 +2500,7 @@
             </a:ln>
             <a:extLst>
               <a:ext uri="{91240B29-F687-4f45-9708-019B960494DF}">
-                <a14:hiddenLine xmlns:a14="http://schemas.microsoft.com/office/drawing/2010/main" xmlns="" w="9525">
+                <a14:hiddenLine xmlns="" xmlns:a14="http://schemas.microsoft.com/office/drawing/2010/main" w="9525">
                   <a:solidFill>
                     <a:srgbClr val="000000"/>
                   </a:solidFill>
@@ -2556,7 +2562,7 @@
             </a:ln>
             <a:extLst>
               <a:ext uri="{91240B29-F687-4f45-9708-019B960494DF}">
-                <a14:hiddenLine xmlns:a14="http://schemas.microsoft.com/office/drawing/2010/main" xmlns="" w="9525">
+                <a14:hiddenLine xmlns="" xmlns:a14="http://schemas.microsoft.com/office/drawing/2010/main" w="9525">
                   <a:solidFill>
                     <a:srgbClr val="000000"/>
                   </a:solidFill>
@@ -2646,7 +2652,7 @@
             </a:ln>
             <a:extLst>
               <a:ext uri="{91240B29-F687-4f45-9708-019B960494DF}">
-                <a14:hiddenLine xmlns:a14="http://schemas.microsoft.com/office/drawing/2010/main" xmlns="" w="9525">
+                <a14:hiddenLine xmlns="" xmlns:a14="http://schemas.microsoft.com/office/drawing/2010/main" w="9525">
                   <a:solidFill>
                     <a:srgbClr val="000000"/>
                   </a:solidFill>
@@ -2714,7 +2720,7 @@
             </a:ln>
             <a:extLst>
               <a:ext uri="{91240B29-F687-4f45-9708-019B960494DF}">
-                <a14:hiddenLine xmlns:a14="http://schemas.microsoft.com/office/drawing/2010/main" xmlns="" w="9525">
+                <a14:hiddenLine xmlns="" xmlns:a14="http://schemas.microsoft.com/office/drawing/2010/main" w="9525">
                   <a:solidFill>
                     <a:srgbClr val="000000"/>
                   </a:solidFill>
@@ -2776,7 +2782,7 @@
             </a:ln>
             <a:extLst>
               <a:ext uri="{91240B29-F687-4f45-9708-019B960494DF}">
-                <a14:hiddenLine xmlns:a14="http://schemas.microsoft.com/office/drawing/2010/main" xmlns="" w="9525">
+                <a14:hiddenLine xmlns="" xmlns:a14="http://schemas.microsoft.com/office/drawing/2010/main" w="9525">
                   <a:solidFill>
                     <a:srgbClr val="000000"/>
                   </a:solidFill>
@@ -2866,7 +2872,7 @@
             </a:ln>
             <a:extLst>
               <a:ext uri="{91240B29-F687-4f45-9708-019B960494DF}">
-                <a14:hiddenLine xmlns:a14="http://schemas.microsoft.com/office/drawing/2010/main" xmlns="" w="9525">
+                <a14:hiddenLine xmlns="" xmlns:a14="http://schemas.microsoft.com/office/drawing/2010/main" w="9525">
                   <a:solidFill>
                     <a:srgbClr val="000000"/>
                   </a:solidFill>
@@ -2928,7 +2934,7 @@
             </a:ln>
             <a:extLst>
               <a:ext uri="{91240B29-F687-4f45-9708-019B960494DF}">
-                <a14:hiddenLine xmlns:a14="http://schemas.microsoft.com/office/drawing/2010/main" xmlns="" w="9525">
+                <a14:hiddenLine xmlns="" xmlns:a14="http://schemas.microsoft.com/office/drawing/2010/main" w="9525">
                   <a:solidFill>
                     <a:srgbClr val="000000"/>
                   </a:solidFill>
@@ -3018,7 +3024,7 @@
             </a:ln>
             <a:extLst>
               <a:ext uri="{91240B29-F687-4f45-9708-019B960494DF}">
-                <a14:hiddenLine xmlns:a14="http://schemas.microsoft.com/office/drawing/2010/main" xmlns="" w="9525">
+                <a14:hiddenLine xmlns="" xmlns:a14="http://schemas.microsoft.com/office/drawing/2010/main" w="9525">
                   <a:solidFill>
                     <a:srgbClr val="000000"/>
                   </a:solidFill>
@@ -3080,7 +3086,7 @@
             </a:ln>
             <a:extLst>
               <a:ext uri="{91240B29-F687-4f45-9708-019B960494DF}">
-                <a14:hiddenLine xmlns:a14="http://schemas.microsoft.com/office/drawing/2010/main" xmlns="" w="9525">
+                <a14:hiddenLine xmlns="" xmlns:a14="http://schemas.microsoft.com/office/drawing/2010/main" w="9525">
                   <a:solidFill>
                     <a:srgbClr val="000000"/>
                   </a:solidFill>
@@ -3170,7 +3176,7 @@
             </a:ln>
             <a:extLst>
               <a:ext uri="{91240B29-F687-4f45-9708-019B960494DF}">
-                <a14:hiddenLine xmlns:a14="http://schemas.microsoft.com/office/drawing/2010/main" xmlns="" w="9525">
+                <a14:hiddenLine xmlns="" xmlns:a14="http://schemas.microsoft.com/office/drawing/2010/main" w="9525">
                   <a:solidFill>
                     <a:srgbClr val="000000"/>
                   </a:solidFill>
@@ -3204,7 +3210,7 @@
             </a:ln>
             <a:extLst>
               <a:ext uri="{91240B29-F687-4f45-9708-019B960494DF}">
-                <a14:hiddenLine xmlns:a14="http://schemas.microsoft.com/office/drawing/2010/main" xmlns="" w="9525">
+                <a14:hiddenLine xmlns="" xmlns:a14="http://schemas.microsoft.com/office/drawing/2010/main" w="9525">
                   <a:solidFill>
                     <a:srgbClr val="000000"/>
                   </a:solidFill>
@@ -3269,7 +3275,7 @@
             </a:ln>
             <a:extLst>
               <a:ext uri="{91240B29-F687-4f45-9708-019B960494DF}">
-                <a14:hiddenLine xmlns:a14="http://schemas.microsoft.com/office/drawing/2010/main" xmlns="" w="9525">
+                <a14:hiddenLine xmlns="" xmlns:a14="http://schemas.microsoft.com/office/drawing/2010/main" w="9525">
                   <a:solidFill>
                     <a:srgbClr val="000000"/>
                   </a:solidFill>
@@ -3359,7 +3365,7 @@
             </a:ln>
             <a:extLst>
               <a:ext uri="{91240B29-F687-4f45-9708-019B960494DF}">
-                <a14:hiddenLine xmlns:a14="http://schemas.microsoft.com/office/drawing/2010/main" xmlns="" w="9525">
+                <a14:hiddenLine xmlns="" xmlns:a14="http://schemas.microsoft.com/office/drawing/2010/main" w="9525">
                   <a:solidFill>
                     <a:srgbClr val="000000"/>
                   </a:solidFill>
@@ -3421,7 +3427,7 @@
             </a:ln>
             <a:extLst>
               <a:ext uri="{91240B29-F687-4f45-9708-019B960494DF}">
-                <a14:hiddenLine xmlns:a14="http://schemas.microsoft.com/office/drawing/2010/main" xmlns="" w="9525">
+                <a14:hiddenLine xmlns="" xmlns:a14="http://schemas.microsoft.com/office/drawing/2010/main" w="9525">
                   <a:solidFill>
                     <a:srgbClr val="000000"/>
                   </a:solidFill>
@@ -3511,7 +3517,7 @@
             </a:ln>
             <a:extLst>
               <a:ext uri="{91240B29-F687-4f45-9708-019B960494DF}">
-                <a14:hiddenLine xmlns:a14="http://schemas.microsoft.com/office/drawing/2010/main" xmlns="" w="9525">
+                <a14:hiddenLine xmlns="" xmlns:a14="http://schemas.microsoft.com/office/drawing/2010/main" w="9525">
                   <a:solidFill>
                     <a:srgbClr val="000000"/>
                   </a:solidFill>
@@ -3601,7 +3607,7 @@
             </a:ln>
             <a:extLst>
               <a:ext uri="{91240B29-F687-4f45-9708-019B960494DF}">
-                <a14:hiddenLine xmlns:a14="http://schemas.microsoft.com/office/drawing/2010/main" xmlns="" w="9525">
+                <a14:hiddenLine xmlns="" xmlns:a14="http://schemas.microsoft.com/office/drawing/2010/main" w="9525">
                   <a:solidFill>
                     <a:srgbClr val="000000"/>
                   </a:solidFill>
@@ -3666,7 +3672,7 @@
             </a:ln>
             <a:extLst>
               <a:ext uri="{91240B29-F687-4f45-9708-019B960494DF}">
-                <a14:hiddenLine xmlns:a14="http://schemas.microsoft.com/office/drawing/2010/main" xmlns="" w="9525">
+                <a14:hiddenLine xmlns="" xmlns:a14="http://schemas.microsoft.com/office/drawing/2010/main" w="9525">
                   <a:solidFill>
                     <a:srgbClr val="000000"/>
                   </a:solidFill>
@@ -3728,7 +3734,7 @@
             </a:ln>
             <a:extLst>
               <a:ext uri="{91240B29-F687-4f45-9708-019B960494DF}">
-                <a14:hiddenLine xmlns:a14="http://schemas.microsoft.com/office/drawing/2010/main" xmlns="" w="9525">
+                <a14:hiddenLine xmlns="" xmlns:a14="http://schemas.microsoft.com/office/drawing/2010/main" w="9525">
                   <a:solidFill>
                     <a:srgbClr val="000000"/>
                   </a:solidFill>
@@ -3818,7 +3824,7 @@
             </a:ln>
             <a:extLst>
               <a:ext uri="{91240B29-F687-4f45-9708-019B960494DF}">
-                <a14:hiddenLine xmlns:a14="http://schemas.microsoft.com/office/drawing/2010/main" xmlns="" w="9525">
+                <a14:hiddenLine xmlns="" xmlns:a14="http://schemas.microsoft.com/office/drawing/2010/main" w="9525">
                   <a:solidFill>
                     <a:srgbClr val="000000"/>
                   </a:solidFill>
@@ -3908,7 +3914,7 @@
             </a:ln>
             <a:extLst>
               <a:ext uri="{91240B29-F687-4f45-9708-019B960494DF}">
-                <a14:hiddenLine xmlns:a14="http://schemas.microsoft.com/office/drawing/2010/main" xmlns="" w="9525">
+                <a14:hiddenLine xmlns="" xmlns:a14="http://schemas.microsoft.com/office/drawing/2010/main" w="9525">
                   <a:solidFill>
                     <a:srgbClr val="000000"/>
                   </a:solidFill>
@@ -3970,7 +3976,7 @@
             </a:ln>
             <a:extLst>
               <a:ext uri="{91240B29-F687-4f45-9708-019B960494DF}">
-                <a14:hiddenLine xmlns:a14="http://schemas.microsoft.com/office/drawing/2010/main" xmlns="" w="9525">
+                <a14:hiddenLine xmlns="" xmlns:a14="http://schemas.microsoft.com/office/drawing/2010/main" w="9525">
                   <a:solidFill>
                     <a:srgbClr val="000000"/>
                   </a:solidFill>
@@ -4090,7 +4096,7 @@
             </a:ln>
             <a:extLst>
               <a:ext uri="{91240B29-F687-4f45-9708-019B960494DF}">
-                <a14:hiddenLine xmlns:a14="http://schemas.microsoft.com/office/drawing/2010/main" xmlns="" w="9525">
+                <a14:hiddenLine xmlns="" xmlns:a14="http://schemas.microsoft.com/office/drawing/2010/main" w="9525">
                   <a:solidFill>
                     <a:srgbClr val="000000"/>
                   </a:solidFill>
@@ -4158,7 +4164,7 @@
             </a:ln>
             <a:extLst>
               <a:ext uri="{91240B29-F687-4f45-9708-019B960494DF}">
-                <a14:hiddenLine xmlns:a14="http://schemas.microsoft.com/office/drawing/2010/main" xmlns="" w="9525">
+                <a14:hiddenLine xmlns="" xmlns:a14="http://schemas.microsoft.com/office/drawing/2010/main" w="9525">
                   <a:solidFill>
                     <a:srgbClr val="000000"/>
                   </a:solidFill>
@@ -4248,7 +4254,7 @@
             </a:ln>
             <a:extLst>
               <a:ext uri="{91240B29-F687-4f45-9708-019B960494DF}">
-                <a14:hiddenLine xmlns:a14="http://schemas.microsoft.com/office/drawing/2010/main" xmlns="" w="9525">
+                <a14:hiddenLine xmlns="" xmlns:a14="http://schemas.microsoft.com/office/drawing/2010/main" w="9525">
                   <a:solidFill>
                     <a:srgbClr val="000000"/>
                   </a:solidFill>
@@ -4388,7 +4394,7 @@
           <a:p>
             <a:fld id="{48A87A34-81AB-432B-8DAE-1953F412C126}" type="datetimeFigureOut">
               <a:rPr lang="en-US" dirty="0"/>
-              <a:t>1/24/2019</a:t>
+              <a:t>1/25/2019</a:t>
             </a:fld>
             <a:endParaRPr lang="en-US" dirty="0"/>
           </a:p>
@@ -4650,7 +4656,7 @@
           <a:p>
             <a:fld id="{48A87A34-81AB-432B-8DAE-1953F412C126}" type="datetimeFigureOut">
               <a:rPr lang="en-US" dirty="0"/>
-              <a:t>1/24/2019</a:t>
+              <a:t>1/25/2019</a:t>
             </a:fld>
             <a:endParaRPr lang="en-US" dirty="0"/>
           </a:p>
@@ -4841,7 +4847,7 @@
           <a:p>
             <a:fld id="{48A87A34-81AB-432B-8DAE-1953F412C126}" type="datetimeFigureOut">
               <a:rPr lang="en-US" dirty="0"/>
-              <a:t>1/24/2019</a:t>
+              <a:t>1/25/2019</a:t>
             </a:fld>
             <a:endParaRPr lang="en-US" dirty="0"/>
           </a:p>
@@ -5099,7 +5105,7 @@
           <a:p>
             <a:fld id="{48A87A34-81AB-432B-8DAE-1953F412C126}" type="datetimeFigureOut">
               <a:rPr lang="en-US" dirty="0"/>
-              <a:t>1/24/2019</a:t>
+              <a:t>1/25/2019</a:t>
             </a:fld>
             <a:endParaRPr lang="en-US" dirty="0"/>
           </a:p>
@@ -5528,7 +5534,7 @@
           <a:p>
             <a:fld id="{48A87A34-81AB-432B-8DAE-1953F412C126}" type="datetimeFigureOut">
               <a:rPr lang="en-US" dirty="0"/>
-              <a:t>1/24/2019</a:t>
+              <a:t>1/25/2019</a:t>
             </a:fld>
             <a:endParaRPr lang="en-US" dirty="0"/>
           </a:p>
@@ -6069,7 +6075,7 @@
           <a:p>
             <a:fld id="{48A87A34-81AB-432B-8DAE-1953F412C126}" type="datetimeFigureOut">
               <a:rPr lang="en-US" dirty="0"/>
-              <a:t>1/24/2019</a:t>
+              <a:t>1/25/2019</a:t>
             </a:fld>
             <a:endParaRPr lang="en-US" dirty="0"/>
           </a:p>
@@ -6784,7 +6790,7 @@
           <a:p>
             <a:fld id="{48A87A34-81AB-432B-8DAE-1953F412C126}" type="datetimeFigureOut">
               <a:rPr lang="en-US" dirty="0"/>
-              <a:t>1/24/2019</a:t>
+              <a:t>1/25/2019</a:t>
             </a:fld>
             <a:endParaRPr lang="en-US" dirty="0"/>
           </a:p>
@@ -6949,7 +6955,7 @@
           <a:p>
             <a:fld id="{48A87A34-81AB-432B-8DAE-1953F412C126}" type="datetimeFigureOut">
               <a:rPr lang="en-US" dirty="0"/>
-              <a:t>1/24/2019</a:t>
+              <a:t>1/25/2019</a:t>
             </a:fld>
             <a:endParaRPr lang="en-US" dirty="0"/>
           </a:p>
@@ -7124,7 +7130,7 @@
           <a:p>
             <a:fld id="{48A87A34-81AB-432B-8DAE-1953F412C126}" type="datetimeFigureOut">
               <a:rPr lang="en-US" dirty="0"/>
-              <a:t>1/24/2019</a:t>
+              <a:t>1/25/2019</a:t>
             </a:fld>
             <a:endParaRPr lang="en-US" dirty="0"/>
           </a:p>
@@ -7289,7 +7295,7 @@
           <a:p>
             <a:fld id="{48A87A34-81AB-432B-8DAE-1953F412C126}" type="datetimeFigureOut">
               <a:rPr lang="en-US" dirty="0"/>
-              <a:t>1/24/2019</a:t>
+              <a:t>1/25/2019</a:t>
             </a:fld>
             <a:endParaRPr lang="en-US" dirty="0"/>
           </a:p>
@@ -7534,7 +7540,7 @@
           <a:p>
             <a:fld id="{48A87A34-81AB-432B-8DAE-1953F412C126}" type="datetimeFigureOut">
               <a:rPr lang="en-US" dirty="0"/>
-              <a:t>1/24/2019</a:t>
+              <a:t>1/25/2019</a:t>
             </a:fld>
             <a:endParaRPr lang="en-US" dirty="0"/>
           </a:p>
@@ -7761,7 +7767,7 @@
           <a:p>
             <a:fld id="{48A87A34-81AB-432B-8DAE-1953F412C126}" type="datetimeFigureOut">
               <a:rPr lang="en-US" dirty="0"/>
-              <a:t>1/24/2019</a:t>
+              <a:t>1/25/2019</a:t>
             </a:fld>
             <a:endParaRPr lang="en-US" dirty="0"/>
           </a:p>
@@ -8137,7 +8143,7 @@
           <a:p>
             <a:fld id="{48A87A34-81AB-432B-8DAE-1953F412C126}" type="datetimeFigureOut">
               <a:rPr lang="en-US" dirty="0"/>
-              <a:t>1/24/2019</a:t>
+              <a:t>1/25/2019</a:t>
             </a:fld>
             <a:endParaRPr lang="en-US" dirty="0"/>
           </a:p>
@@ -8250,7 +8256,7 @@
           <a:p>
             <a:fld id="{48A87A34-81AB-432B-8DAE-1953F412C126}" type="datetimeFigureOut">
               <a:rPr lang="en-US" dirty="0"/>
-              <a:t>1/24/2019</a:t>
+              <a:t>1/25/2019</a:t>
             </a:fld>
             <a:endParaRPr lang="en-US" dirty="0"/>
           </a:p>
@@ -8340,7 +8346,7 @@
           <a:p>
             <a:fld id="{48A87A34-81AB-432B-8DAE-1953F412C126}" type="datetimeFigureOut">
               <a:rPr lang="en-US" dirty="0"/>
-              <a:t>1/24/2019</a:t>
+              <a:t>1/25/2019</a:t>
             </a:fld>
             <a:endParaRPr lang="en-US" dirty="0"/>
           </a:p>
@@ -8584,7 +8590,7 @@
           <a:p>
             <a:fld id="{48A87A34-81AB-432B-8DAE-1953F412C126}" type="datetimeFigureOut">
               <a:rPr lang="en-US" dirty="0"/>
-              <a:t>1/24/2019</a:t>
+              <a:t>1/25/2019</a:t>
             </a:fld>
             <a:endParaRPr lang="en-US" dirty="0"/>
           </a:p>
@@ -8859,7 +8865,7 @@
           <a:p>
             <a:fld id="{48A87A34-81AB-432B-8DAE-1953F412C126}" type="datetimeFigureOut">
               <a:rPr lang="en-US" dirty="0"/>
-              <a:t>1/24/2019</a:t>
+              <a:t>1/25/2019</a:t>
             </a:fld>
             <a:endParaRPr lang="en-US" dirty="0"/>
           </a:p>
@@ -8970,7 +8976,7 @@
           <a:noFill/>
           <a:extLst>
             <a:ext uri="{909E8E84-426E-40dd-AFC4-6F175D3DCCD1}">
-              <a14:hiddenFill xmlns:a14="http://schemas.microsoft.com/office/drawing/2010/main" xmlns="">
+              <a14:hiddenFill xmlns="" xmlns:a14="http://schemas.microsoft.com/office/drawing/2010/main">
                 <a:solidFill>
                   <a:srgbClr val="FFFFFF"/>
                 </a:solidFill>
@@ -9044,7 +9050,7 @@
               </a:ln>
               <a:extLst>
                 <a:ext uri="{91240B29-F687-4f45-9708-019B960494DF}">
-                  <a14:hiddenLine xmlns:a14="http://schemas.microsoft.com/office/drawing/2010/main" xmlns="" w="9525">
+                  <a14:hiddenLine xmlns="" xmlns:a14="http://schemas.microsoft.com/office/drawing/2010/main" w="9525">
                     <a:solidFill>
                       <a:srgbClr val="000000"/>
                     </a:solidFill>
@@ -9134,7 +9140,7 @@
               </a:ln>
               <a:extLst>
                 <a:ext uri="{91240B29-F687-4f45-9708-019B960494DF}">
-                  <a14:hiddenLine xmlns:a14="http://schemas.microsoft.com/office/drawing/2010/main" xmlns="" w="9525">
+                  <a14:hiddenLine xmlns="" xmlns:a14="http://schemas.microsoft.com/office/drawing/2010/main" w="9525">
                     <a:solidFill>
                       <a:srgbClr val="000000"/>
                     </a:solidFill>
@@ -9224,7 +9230,7 @@
               </a:ln>
               <a:extLst>
                 <a:ext uri="{91240B29-F687-4f45-9708-019B960494DF}">
-                  <a14:hiddenLine xmlns:a14="http://schemas.microsoft.com/office/drawing/2010/main" xmlns="" w="9525">
+                  <a14:hiddenLine xmlns="" xmlns:a14="http://schemas.microsoft.com/office/drawing/2010/main" w="9525">
                     <a:solidFill>
                       <a:srgbClr val="000000"/>
                     </a:solidFill>
@@ -9286,7 +9292,7 @@
               </a:ln>
               <a:extLst>
                 <a:ext uri="{91240B29-F687-4f45-9708-019B960494DF}">
-                  <a14:hiddenLine xmlns:a14="http://schemas.microsoft.com/office/drawing/2010/main" xmlns="" w="9525">
+                  <a14:hiddenLine xmlns="" xmlns:a14="http://schemas.microsoft.com/office/drawing/2010/main" w="9525">
                     <a:solidFill>
                       <a:srgbClr val="000000"/>
                     </a:solidFill>
@@ -9376,7 +9382,7 @@
               </a:ln>
               <a:extLst>
                 <a:ext uri="{91240B29-F687-4f45-9708-019B960494DF}">
-                  <a14:hiddenLine xmlns:a14="http://schemas.microsoft.com/office/drawing/2010/main" xmlns="" w="9525">
+                  <a14:hiddenLine xmlns="" xmlns:a14="http://schemas.microsoft.com/office/drawing/2010/main" w="9525">
                     <a:solidFill>
                       <a:srgbClr val="000000"/>
                     </a:solidFill>
@@ -9438,7 +9444,7 @@
               </a:ln>
               <a:extLst>
                 <a:ext uri="{91240B29-F687-4f45-9708-019B960494DF}">
-                  <a14:hiddenLine xmlns:a14="http://schemas.microsoft.com/office/drawing/2010/main" xmlns="" w="9525">
+                  <a14:hiddenLine xmlns="" xmlns:a14="http://schemas.microsoft.com/office/drawing/2010/main" w="9525">
                     <a:solidFill>
                       <a:srgbClr val="000000"/>
                     </a:solidFill>
@@ -9500,7 +9506,7 @@
               </a:ln>
               <a:extLst>
                 <a:ext uri="{91240B29-F687-4f45-9708-019B960494DF}">
-                  <a14:hiddenLine xmlns:a14="http://schemas.microsoft.com/office/drawing/2010/main" xmlns="" w="9525">
+                  <a14:hiddenLine xmlns="" xmlns:a14="http://schemas.microsoft.com/office/drawing/2010/main" w="9525">
                     <a:solidFill>
                       <a:srgbClr val="000000"/>
                     </a:solidFill>
@@ -9590,7 +9596,7 @@
               </a:ln>
               <a:extLst>
                 <a:ext uri="{91240B29-F687-4f45-9708-019B960494DF}">
-                  <a14:hiddenLine xmlns:a14="http://schemas.microsoft.com/office/drawing/2010/main" xmlns="" w="9525">
+                  <a14:hiddenLine xmlns="" xmlns:a14="http://schemas.microsoft.com/office/drawing/2010/main" w="9525">
                     <a:solidFill>
                       <a:srgbClr val="000000"/>
                     </a:solidFill>
@@ -9680,7 +9686,7 @@
               </a:ln>
               <a:extLst>
                 <a:ext uri="{91240B29-F687-4f45-9708-019B960494DF}">
-                  <a14:hiddenLine xmlns:a14="http://schemas.microsoft.com/office/drawing/2010/main" xmlns="" w="9525">
+                  <a14:hiddenLine xmlns="" xmlns:a14="http://schemas.microsoft.com/office/drawing/2010/main" w="9525">
                     <a:solidFill>
                       <a:srgbClr val="000000"/>
                     </a:solidFill>
@@ -9742,7 +9748,7 @@
               </a:ln>
               <a:extLst>
                 <a:ext uri="{91240B29-F687-4f45-9708-019B960494DF}">
-                  <a14:hiddenLine xmlns:a14="http://schemas.microsoft.com/office/drawing/2010/main" xmlns="" w="9525">
+                  <a14:hiddenLine xmlns="" xmlns:a14="http://schemas.microsoft.com/office/drawing/2010/main" w="9525">
                     <a:solidFill>
                       <a:srgbClr val="000000"/>
                     </a:solidFill>
@@ -9852,7 +9858,7 @@
               </a:ln>
               <a:extLst>
                 <a:ext uri="{91240B29-F687-4f45-9708-019B960494DF}">
-                  <a14:hiddenLine xmlns:a14="http://schemas.microsoft.com/office/drawing/2010/main" xmlns="" w="9525">
+                  <a14:hiddenLine xmlns="" xmlns:a14="http://schemas.microsoft.com/office/drawing/2010/main" w="9525">
                     <a:solidFill>
                       <a:srgbClr val="000000"/>
                     </a:solidFill>
@@ -9936,7 +9942,7 @@
               </a:ln>
               <a:extLst>
                 <a:ext uri="{91240B29-F687-4f45-9708-019B960494DF}">
-                  <a14:hiddenLine xmlns:a14="http://schemas.microsoft.com/office/drawing/2010/main" xmlns="" w="9525">
+                  <a14:hiddenLine xmlns="" xmlns:a14="http://schemas.microsoft.com/office/drawing/2010/main" w="9525">
                     <a:solidFill>
                       <a:srgbClr val="000000"/>
                     </a:solidFill>
@@ -9998,7 +10004,7 @@
               </a:ln>
               <a:extLst>
                 <a:ext uri="{91240B29-F687-4f45-9708-019B960494DF}">
-                  <a14:hiddenLine xmlns:a14="http://schemas.microsoft.com/office/drawing/2010/main" xmlns="" w="9525">
+                  <a14:hiddenLine xmlns="" xmlns:a14="http://schemas.microsoft.com/office/drawing/2010/main" w="9525">
                     <a:solidFill>
                       <a:srgbClr val="000000"/>
                     </a:solidFill>
@@ -10060,7 +10066,7 @@
               </a:ln>
               <a:extLst>
                 <a:ext uri="{91240B29-F687-4f45-9708-019B960494DF}">
-                  <a14:hiddenLine xmlns:a14="http://schemas.microsoft.com/office/drawing/2010/main" xmlns="" w="9525">
+                  <a14:hiddenLine xmlns="" xmlns:a14="http://schemas.microsoft.com/office/drawing/2010/main" w="9525">
                     <a:solidFill>
                       <a:srgbClr val="000000"/>
                     </a:solidFill>
@@ -10150,7 +10156,7 @@
               </a:ln>
               <a:extLst>
                 <a:ext uri="{91240B29-F687-4f45-9708-019B960494DF}">
-                  <a14:hiddenLine xmlns:a14="http://schemas.microsoft.com/office/drawing/2010/main" xmlns="" w="9525">
+                  <a14:hiddenLine xmlns="" xmlns:a14="http://schemas.microsoft.com/office/drawing/2010/main" w="9525">
                     <a:solidFill>
                       <a:srgbClr val="000000"/>
                     </a:solidFill>
@@ -10184,7 +10190,7 @@
               </a:ln>
               <a:extLst>
                 <a:ext uri="{91240B29-F687-4f45-9708-019B960494DF}">
-                  <a14:hiddenLine xmlns:a14="http://schemas.microsoft.com/office/drawing/2010/main" xmlns="" w="9525">
+                  <a14:hiddenLine xmlns="" xmlns:a14="http://schemas.microsoft.com/office/drawing/2010/main" w="9525">
                     <a:solidFill>
                       <a:srgbClr val="000000"/>
                     </a:solidFill>
@@ -10249,7 +10255,7 @@
               </a:ln>
               <a:extLst>
                 <a:ext uri="{91240B29-F687-4f45-9708-019B960494DF}">
-                  <a14:hiddenLine xmlns:a14="http://schemas.microsoft.com/office/drawing/2010/main" xmlns="" w="9525">
+                  <a14:hiddenLine xmlns="" xmlns:a14="http://schemas.microsoft.com/office/drawing/2010/main" w="9525">
                     <a:solidFill>
                       <a:srgbClr val="000000"/>
                     </a:solidFill>
@@ -10339,7 +10345,7 @@
               </a:ln>
               <a:extLst>
                 <a:ext uri="{91240B29-F687-4f45-9708-019B960494DF}">
-                  <a14:hiddenLine xmlns:a14="http://schemas.microsoft.com/office/drawing/2010/main" xmlns="" w="9525">
+                  <a14:hiddenLine xmlns="" xmlns:a14="http://schemas.microsoft.com/office/drawing/2010/main" w="9525">
                     <a:solidFill>
                       <a:srgbClr val="000000"/>
                     </a:solidFill>
@@ -10401,7 +10407,7 @@
               </a:ln>
               <a:extLst>
                 <a:ext uri="{91240B29-F687-4f45-9708-019B960494DF}">
-                  <a14:hiddenLine xmlns:a14="http://schemas.microsoft.com/office/drawing/2010/main" xmlns="" w="9525">
+                  <a14:hiddenLine xmlns="" xmlns:a14="http://schemas.microsoft.com/office/drawing/2010/main" w="9525">
                     <a:solidFill>
                       <a:srgbClr val="000000"/>
                     </a:solidFill>
@@ -10491,7 +10497,7 @@
               </a:ln>
               <a:extLst>
                 <a:ext uri="{91240B29-F687-4f45-9708-019B960494DF}">
-                  <a14:hiddenLine xmlns:a14="http://schemas.microsoft.com/office/drawing/2010/main" xmlns="" w="9525">
+                  <a14:hiddenLine xmlns="" xmlns:a14="http://schemas.microsoft.com/office/drawing/2010/main" w="9525">
                     <a:solidFill>
                       <a:srgbClr val="000000"/>
                     </a:solidFill>
@@ -10556,7 +10562,7 @@
               </a:ln>
               <a:extLst>
                 <a:ext uri="{91240B29-F687-4f45-9708-019B960494DF}">
-                  <a14:hiddenLine xmlns:a14="http://schemas.microsoft.com/office/drawing/2010/main" xmlns="" w="9525">
+                  <a14:hiddenLine xmlns="" xmlns:a14="http://schemas.microsoft.com/office/drawing/2010/main" w="9525">
                     <a:solidFill>
                       <a:srgbClr val="000000"/>
                     </a:solidFill>
@@ -10618,7 +10624,7 @@
               </a:ln>
               <a:extLst>
                 <a:ext uri="{91240B29-F687-4f45-9708-019B960494DF}">
-                  <a14:hiddenLine xmlns:a14="http://schemas.microsoft.com/office/drawing/2010/main" xmlns="" w="9525">
+                  <a14:hiddenLine xmlns="" xmlns:a14="http://schemas.microsoft.com/office/drawing/2010/main" w="9525">
                     <a:solidFill>
                       <a:srgbClr val="000000"/>
                     </a:solidFill>
@@ -10708,7 +10714,7 @@
               </a:ln>
               <a:extLst>
                 <a:ext uri="{91240B29-F687-4f45-9708-019B960494DF}">
-                  <a14:hiddenLine xmlns:a14="http://schemas.microsoft.com/office/drawing/2010/main" xmlns="" w="9525">
+                  <a14:hiddenLine xmlns="" xmlns:a14="http://schemas.microsoft.com/office/drawing/2010/main" w="9525">
                     <a:solidFill>
                       <a:srgbClr val="000000"/>
                     </a:solidFill>
@@ -10798,7 +10804,7 @@
               </a:ln>
               <a:extLst>
                 <a:ext uri="{91240B29-F687-4f45-9708-019B960494DF}">
-                  <a14:hiddenLine xmlns:a14="http://schemas.microsoft.com/office/drawing/2010/main" xmlns="" w="9525">
+                  <a14:hiddenLine xmlns="" xmlns:a14="http://schemas.microsoft.com/office/drawing/2010/main" w="9525">
                     <a:solidFill>
                       <a:srgbClr val="000000"/>
                     </a:solidFill>
@@ -10863,7 +10869,7 @@
               </a:ln>
               <a:extLst>
                 <a:ext uri="{91240B29-F687-4f45-9708-019B960494DF}">
-                  <a14:hiddenLine xmlns:a14="http://schemas.microsoft.com/office/drawing/2010/main" xmlns="" w="9525">
+                  <a14:hiddenLine xmlns="" xmlns:a14="http://schemas.microsoft.com/office/drawing/2010/main" w="9525">
                     <a:solidFill>
                       <a:srgbClr val="000000"/>
                     </a:solidFill>
@@ -10983,7 +10989,7 @@
               </a:ln>
               <a:extLst>
                 <a:ext uri="{91240B29-F687-4f45-9708-019B960494DF}">
-                  <a14:hiddenLine xmlns:a14="http://schemas.microsoft.com/office/drawing/2010/main" xmlns="" w="9525">
+                  <a14:hiddenLine xmlns="" xmlns:a14="http://schemas.microsoft.com/office/drawing/2010/main" w="9525">
                     <a:solidFill>
                       <a:srgbClr val="000000"/>
                     </a:solidFill>
@@ -11081,7 +11087,7 @@
               </a:ln>
               <a:extLst>
                 <a:ext uri="{91240B29-F687-4f45-9708-019B960494DF}">
-                  <a14:hiddenLine xmlns:a14="http://schemas.microsoft.com/office/drawing/2010/main" xmlns="" w="9525">
+                  <a14:hiddenLine xmlns="" xmlns:a14="http://schemas.microsoft.com/office/drawing/2010/main" w="9525">
                     <a:solidFill>
                       <a:srgbClr val="000000"/>
                     </a:solidFill>
@@ -11196,7 +11202,7 @@
               </a:ln>
               <a:extLst>
                 <a:ext uri="{91240B29-F687-4f45-9708-019B960494DF}">
-                  <a14:hiddenLine xmlns:a14="http://schemas.microsoft.com/office/drawing/2010/main" xmlns="" w="9525">
+                  <a14:hiddenLine xmlns="" xmlns:a14="http://schemas.microsoft.com/office/drawing/2010/main" w="9525">
                     <a:solidFill>
                       <a:srgbClr val="000000"/>
                     </a:solidFill>
@@ -11286,7 +11292,7 @@
               </a:ln>
               <a:extLst>
                 <a:ext uri="{91240B29-F687-4f45-9708-019B960494DF}">
-                  <a14:hiddenLine xmlns:a14="http://schemas.microsoft.com/office/drawing/2010/main" xmlns="" w="9525">
+                  <a14:hiddenLine xmlns="" xmlns:a14="http://schemas.microsoft.com/office/drawing/2010/main" w="9525">
                     <a:solidFill>
                       <a:srgbClr val="000000"/>
                     </a:solidFill>
@@ -11351,7 +11357,7 @@
               </a:ln>
               <a:extLst>
                 <a:ext uri="{91240B29-F687-4f45-9708-019B960494DF}">
-                  <a14:hiddenLine xmlns:a14="http://schemas.microsoft.com/office/drawing/2010/main" xmlns="" w="9525">
+                  <a14:hiddenLine xmlns="" xmlns:a14="http://schemas.microsoft.com/office/drawing/2010/main" w="9525">
                     <a:solidFill>
                       <a:srgbClr val="000000"/>
                     </a:solidFill>
@@ -11441,7 +11447,7 @@
               </a:ln>
               <a:extLst>
                 <a:ext uri="{91240B29-F687-4f45-9708-019B960494DF}">
-                  <a14:hiddenLine xmlns:a14="http://schemas.microsoft.com/office/drawing/2010/main" xmlns="" w="9525">
+                  <a14:hiddenLine xmlns="" xmlns:a14="http://schemas.microsoft.com/office/drawing/2010/main" w="9525">
                     <a:solidFill>
                       <a:srgbClr val="000000"/>
                     </a:solidFill>
@@ -11509,7 +11515,7 @@
               </a:ln>
               <a:extLst>
                 <a:ext uri="{91240B29-F687-4f45-9708-019B960494DF}">
-                  <a14:hiddenLine xmlns:a14="http://schemas.microsoft.com/office/drawing/2010/main" xmlns="" w="9525">
+                  <a14:hiddenLine xmlns="" xmlns:a14="http://schemas.microsoft.com/office/drawing/2010/main" w="9525">
                     <a:solidFill>
                       <a:srgbClr val="000000"/>
                     </a:solidFill>
@@ -11599,7 +11605,7 @@
               </a:ln>
               <a:extLst>
                 <a:ext uri="{91240B29-F687-4f45-9708-019B960494DF}">
-                  <a14:hiddenLine xmlns:a14="http://schemas.microsoft.com/office/drawing/2010/main" xmlns="" w="9525">
+                  <a14:hiddenLine xmlns="" xmlns:a14="http://schemas.microsoft.com/office/drawing/2010/main" w="9525">
                     <a:solidFill>
                       <a:srgbClr val="000000"/>
                     </a:solidFill>
@@ -11667,7 +11673,7 @@
               </a:ln>
               <a:extLst>
                 <a:ext uri="{91240B29-F687-4f45-9708-019B960494DF}">
-                  <a14:hiddenLine xmlns:a14="http://schemas.microsoft.com/office/drawing/2010/main" xmlns="" w="9525">
+                  <a14:hiddenLine xmlns="" xmlns:a14="http://schemas.microsoft.com/office/drawing/2010/main" w="9525">
                     <a:solidFill>
                       <a:srgbClr val="000000"/>
                     </a:solidFill>
@@ -11757,7 +11763,7 @@
               </a:ln>
               <a:extLst>
                 <a:ext uri="{91240B29-F687-4f45-9708-019B960494DF}">
-                  <a14:hiddenLine xmlns:a14="http://schemas.microsoft.com/office/drawing/2010/main" xmlns="" w="9525">
+                  <a14:hiddenLine xmlns="" xmlns:a14="http://schemas.microsoft.com/office/drawing/2010/main" w="9525">
                     <a:solidFill>
                       <a:srgbClr val="000000"/>
                     </a:solidFill>
@@ -11791,7 +11797,7 @@
               </a:ln>
               <a:extLst>
                 <a:ext uri="{91240B29-F687-4f45-9708-019B960494DF}">
-                  <a14:hiddenLine xmlns:a14="http://schemas.microsoft.com/office/drawing/2010/main" xmlns="" w="9525">
+                  <a14:hiddenLine xmlns="" xmlns:a14="http://schemas.microsoft.com/office/drawing/2010/main" w="9525">
                     <a:solidFill>
                       <a:srgbClr val="000000"/>
                     </a:solidFill>
@@ -11932,7 +11938,7 @@
             <a:fld id="{48A87A34-81AB-432B-8DAE-1953F412C126}" type="datetimeFigureOut">
               <a:rPr lang="en-US" dirty="0"/>
               <a:pPr/>
-              <a:t>1/24/2019</a:t>
+              <a:t>1/25/2019</a:t>
             </a:fld>
             <a:endParaRPr lang="en-US" dirty="0"/>
           </a:p>
@@ -12847,6 +12853,129 @@
 </p:sld>
 </file>
 
+<file path=ppt/slides/slide7.xml><?xml version="1.0" encoding="utf-8"?>
+<p:sld xmlns:a="http://schemas.openxmlformats.org/drawingml/2006/main" xmlns:r="http://schemas.openxmlformats.org/officeDocument/2006/relationships" xmlns:p="http://schemas.openxmlformats.org/presentationml/2006/main">
+  <p:cSld>
+    <p:spTree>
+      <p:nvGrpSpPr>
+        <p:cNvPr id="1" name=""/>
+        <p:cNvGrpSpPr/>
+        <p:nvPr/>
+      </p:nvGrpSpPr>
+      <p:grpSpPr>
+        <a:xfrm>
+          <a:off x="0" y="0"/>
+          <a:ext cx="0" cy="0"/>
+          <a:chOff x="0" y="0"/>
+          <a:chExt cx="0" cy="0"/>
+        </a:xfrm>
+      </p:grpSpPr>
+      <p:sp>
+        <p:nvSpPr>
+          <p:cNvPr id="2" name="Titre 1"/>
+          <p:cNvSpPr>
+            <a:spLocks noGrp="1"/>
+          </p:cNvSpPr>
+          <p:nvPr>
+            <p:ph type="title"/>
+          </p:nvPr>
+        </p:nvSpPr>
+        <p:spPr/>
+        <p:txBody>
+          <a:bodyPr/>
+          <a:lstStyle/>
+          <a:p>
+            <a:pPr algn="ctr"/>
+            <a:r>
+              <a:rPr lang="fr-CH" dirty="0" smtClean="0"/>
+              <a:t>QUESIONS ? </a:t>
+            </a:r>
+            <a:endParaRPr lang="fr-CH" dirty="0"/>
+          </a:p>
+        </p:txBody>
+      </p:sp>
+      <p:sp>
+        <p:nvSpPr>
+          <p:cNvPr id="4" name="AutoShape 2" descr="Image result for questions png"/>
+          <p:cNvSpPr>
+            <a:spLocks noChangeAspect="1" noChangeArrowheads="1"/>
+          </p:cNvSpPr>
+          <p:nvPr/>
+        </p:nvSpPr>
+        <p:spPr bwMode="auto">
+          <a:xfrm>
+            <a:off x="155575" y="-144463"/>
+            <a:ext cx="304800" cy="304801"/>
+          </a:xfrm>
+          <a:prstGeom prst="rect">
+            <a:avLst/>
+          </a:prstGeom>
+          <a:noFill/>
+          <a:extLst>
+            <a:ext uri="{909E8E84-426E-40DD-AFC4-6F175D3DCCD1}">
+              <a14:hiddenFill xmlns:a14="http://schemas.microsoft.com/office/drawing/2010/main">
+                <a:solidFill>
+                  <a:srgbClr val="FFFFFF"/>
+                </a:solidFill>
+              </a14:hiddenFill>
+            </a:ext>
+          </a:extLst>
+        </p:spPr>
+        <p:txBody>
+          <a:bodyPr vert="horz" wrap="square" lIns="91440" tIns="45720" rIns="91440" bIns="45720" numCol="1" anchor="t" anchorCtr="0" compatLnSpc="1">
+            <a:prstTxWarp prst="textNoShape">
+              <a:avLst/>
+            </a:prstTxWarp>
+          </a:bodyPr>
+          <a:lstStyle/>
+          <a:p>
+            <a:endParaRPr lang="fr-CH"/>
+          </a:p>
+        </p:txBody>
+      </p:sp>
+      <p:pic>
+        <p:nvPicPr>
+          <p:cNvPr id="6" name="Image 5"/>
+          <p:cNvPicPr>
+            <a:picLocks noChangeAspect="1"/>
+          </p:cNvPicPr>
+          <p:nvPr/>
+        </p:nvPicPr>
+        <p:blipFill>
+          <a:blip r:embed="rId2">
+            <a:extLst>
+              <a:ext uri="{28A0092B-C50C-407E-A947-70E740481C1C}">
+                <a14:useLocalDpi xmlns:a14="http://schemas.microsoft.com/office/drawing/2010/main" val="0"/>
+              </a:ext>
+            </a:extLst>
+          </a:blip>
+          <a:stretch>
+            <a:fillRect/>
+          </a:stretch>
+        </p:blipFill>
+        <p:spPr>
+          <a:xfrm>
+            <a:off x="3710491" y="2236124"/>
+            <a:ext cx="4767842" cy="2907221"/>
+          </a:xfrm>
+          <a:prstGeom prst="rect">
+            <a:avLst/>
+          </a:prstGeom>
+        </p:spPr>
+      </p:pic>
+    </p:spTree>
+    <p:extLst>
+      <p:ext uri="{BB962C8B-B14F-4D97-AF65-F5344CB8AC3E}">
+        <p14:creationId xmlns:p14="http://schemas.microsoft.com/office/powerpoint/2010/main" val="3823780413"/>
+      </p:ext>
+    </p:extLst>
+  </p:cSld>
+  <p:clrMapOvr>
+    <a:masterClrMapping/>
+  </p:clrMapOvr>
+</p:sld>
+</file>
+
 <file path=ppt/theme/theme1.xml><?xml version="1.0" encoding="utf-8"?>
 <a:theme xmlns:a="http://schemas.openxmlformats.org/drawingml/2006/main" name="Circuit">
   <a:themeElements>

</xml_diff>

<commit_message>
Finalisation de la présentation de la semaine COM
</commit_message>
<xml_diff>
--- a/Presentation Pyramid.pptx
+++ b/Presentation Pyramid.pptx
@@ -9,9 +9,12 @@
     <p:sldId id="257" r:id="rId3"/>
     <p:sldId id="258" r:id="rId4"/>
     <p:sldId id="259" r:id="rId5"/>
-    <p:sldId id="260" r:id="rId6"/>
-    <p:sldId id="261" r:id="rId7"/>
-    <p:sldId id="263" r:id="rId8"/>
+    <p:sldId id="264" r:id="rId6"/>
+    <p:sldId id="260" r:id="rId7"/>
+    <p:sldId id="265" r:id="rId8"/>
+    <p:sldId id="266" r:id="rId9"/>
+    <p:sldId id="261" r:id="rId10"/>
+    <p:sldId id="263" r:id="rId11"/>
   </p:sldIdLst>
   <p:sldSz cx="12192000" cy="6858000"/>
   <p:notesSz cx="6858000" cy="9144000"/>
@@ -168,7 +171,7 @@
           <a:noFill/>
           <a:extLst>
             <a:ext uri="{909E8E84-426E-40dd-AFC4-6F175D3DCCD1}">
-              <a14:hiddenFill xmlns="" xmlns:a14="http://schemas.microsoft.com/office/drawing/2010/main">
+              <a14:hiddenFill xmlns:a14="http://schemas.microsoft.com/office/drawing/2010/main" xmlns="">
                 <a:solidFill>
                   <a:srgbClr val="FFFFFF"/>
                 </a:solidFill>
@@ -228,7 +231,7 @@
             </a:ln>
             <a:extLst>
               <a:ext uri="{91240B29-F687-4f45-9708-019B960494DF}">
-                <a14:hiddenLine xmlns="" xmlns:a14="http://schemas.microsoft.com/office/drawing/2010/main" w="9525">
+                <a14:hiddenLine xmlns:a14="http://schemas.microsoft.com/office/drawing/2010/main" xmlns="" w="9525">
                   <a:solidFill>
                     <a:srgbClr val="000000"/>
                   </a:solidFill>
@@ -318,7 +321,7 @@
             </a:ln>
             <a:extLst>
               <a:ext uri="{91240B29-F687-4f45-9708-019B960494DF}">
-                <a14:hiddenLine xmlns="" xmlns:a14="http://schemas.microsoft.com/office/drawing/2010/main" w="9525">
+                <a14:hiddenLine xmlns:a14="http://schemas.microsoft.com/office/drawing/2010/main" xmlns="" w="9525">
                   <a:solidFill>
                     <a:srgbClr val="000000"/>
                   </a:solidFill>
@@ -408,7 +411,7 @@
             </a:ln>
             <a:extLst>
               <a:ext uri="{91240B29-F687-4f45-9708-019B960494DF}">
-                <a14:hiddenLine xmlns="" xmlns:a14="http://schemas.microsoft.com/office/drawing/2010/main" w="9525">
+                <a14:hiddenLine xmlns:a14="http://schemas.microsoft.com/office/drawing/2010/main" xmlns="" w="9525">
                   <a:solidFill>
                     <a:srgbClr val="000000"/>
                   </a:solidFill>
@@ -442,7 +445,7 @@
             </a:ln>
             <a:extLst>
               <a:ext uri="{91240B29-F687-4f45-9708-019B960494DF}">
-                <a14:hiddenLine xmlns="" xmlns:a14="http://schemas.microsoft.com/office/drawing/2010/main" w="9525">
+                <a14:hiddenLine xmlns:a14="http://schemas.microsoft.com/office/drawing/2010/main" xmlns="" w="9525">
                   <a:solidFill>
                     <a:srgbClr val="000000"/>
                   </a:solidFill>
@@ -532,7 +535,7 @@
             </a:ln>
             <a:extLst>
               <a:ext uri="{91240B29-F687-4f45-9708-019B960494DF}">
-                <a14:hiddenLine xmlns="" xmlns:a14="http://schemas.microsoft.com/office/drawing/2010/main" w="9525">
+                <a14:hiddenLine xmlns:a14="http://schemas.microsoft.com/office/drawing/2010/main" xmlns="" w="9525">
                   <a:solidFill>
                     <a:srgbClr val="000000"/>
                   </a:solidFill>
@@ -594,7 +597,7 @@
             </a:ln>
             <a:extLst>
               <a:ext uri="{91240B29-F687-4f45-9708-019B960494DF}">
-                <a14:hiddenLine xmlns="" xmlns:a14="http://schemas.microsoft.com/office/drawing/2010/main" w="9525">
+                <a14:hiddenLine xmlns:a14="http://schemas.microsoft.com/office/drawing/2010/main" xmlns="" w="9525">
                   <a:solidFill>
                     <a:srgbClr val="000000"/>
                   </a:solidFill>
@@ -656,7 +659,7 @@
             </a:ln>
             <a:extLst>
               <a:ext uri="{91240B29-F687-4f45-9708-019B960494DF}">
-                <a14:hiddenLine xmlns="" xmlns:a14="http://schemas.microsoft.com/office/drawing/2010/main" w="9525">
+                <a14:hiddenLine xmlns:a14="http://schemas.microsoft.com/office/drawing/2010/main" xmlns="" w="9525">
                   <a:solidFill>
                     <a:srgbClr val="000000"/>
                   </a:solidFill>
@@ -746,7 +749,7 @@
             </a:ln>
             <a:extLst>
               <a:ext uri="{91240B29-F687-4f45-9708-019B960494DF}">
-                <a14:hiddenLine xmlns="" xmlns:a14="http://schemas.microsoft.com/office/drawing/2010/main" w="9525">
+                <a14:hiddenLine xmlns:a14="http://schemas.microsoft.com/office/drawing/2010/main" xmlns="" w="9525">
                   <a:solidFill>
                     <a:srgbClr val="000000"/>
                   </a:solidFill>
@@ -808,7 +811,7 @@
             </a:ln>
             <a:extLst>
               <a:ext uri="{91240B29-F687-4f45-9708-019B960494DF}">
-                <a14:hiddenLine xmlns="" xmlns:a14="http://schemas.microsoft.com/office/drawing/2010/main" w="9525">
+                <a14:hiddenLine xmlns:a14="http://schemas.microsoft.com/office/drawing/2010/main" xmlns="" w="9525">
                   <a:solidFill>
                     <a:srgbClr val="000000"/>
                   </a:solidFill>
@@ -870,7 +873,7 @@
             </a:ln>
             <a:extLst>
               <a:ext uri="{91240B29-F687-4f45-9708-019B960494DF}">
-                <a14:hiddenLine xmlns="" xmlns:a14="http://schemas.microsoft.com/office/drawing/2010/main" w="9525">
+                <a14:hiddenLine xmlns:a14="http://schemas.microsoft.com/office/drawing/2010/main" xmlns="" w="9525">
                   <a:solidFill>
                     <a:srgbClr val="000000"/>
                   </a:solidFill>
@@ -960,7 +963,7 @@
             </a:ln>
             <a:extLst>
               <a:ext uri="{91240B29-F687-4f45-9708-019B960494DF}">
-                <a14:hiddenLine xmlns="" xmlns:a14="http://schemas.microsoft.com/office/drawing/2010/main" w="9525">
+                <a14:hiddenLine xmlns:a14="http://schemas.microsoft.com/office/drawing/2010/main" xmlns="" w="9525">
                   <a:solidFill>
                     <a:srgbClr val="000000"/>
                   </a:solidFill>
@@ -1050,7 +1053,7 @@
             </a:ln>
             <a:extLst>
               <a:ext uri="{91240B29-F687-4f45-9708-019B960494DF}">
-                <a14:hiddenLine xmlns="" xmlns:a14="http://schemas.microsoft.com/office/drawing/2010/main" w="9525">
+                <a14:hiddenLine xmlns:a14="http://schemas.microsoft.com/office/drawing/2010/main" xmlns="" w="9525">
                   <a:solidFill>
                     <a:srgbClr val="000000"/>
                   </a:solidFill>
@@ -1112,7 +1115,7 @@
             </a:ln>
             <a:extLst>
               <a:ext uri="{91240B29-F687-4f45-9708-019B960494DF}">
-                <a14:hiddenLine xmlns="" xmlns:a14="http://schemas.microsoft.com/office/drawing/2010/main" w="9525">
+                <a14:hiddenLine xmlns:a14="http://schemas.microsoft.com/office/drawing/2010/main" xmlns="" w="9525">
                   <a:solidFill>
                     <a:srgbClr val="000000"/>
                   </a:solidFill>
@@ -1222,7 +1225,7 @@
             </a:ln>
             <a:extLst>
               <a:ext uri="{91240B29-F687-4f45-9708-019B960494DF}">
-                <a14:hiddenLine xmlns="" xmlns:a14="http://schemas.microsoft.com/office/drawing/2010/main" w="9525">
+                <a14:hiddenLine xmlns:a14="http://schemas.microsoft.com/office/drawing/2010/main" xmlns="" w="9525">
                   <a:solidFill>
                     <a:srgbClr val="000000"/>
                   </a:solidFill>
@@ -1284,7 +1287,7 @@
             </a:ln>
             <a:extLst>
               <a:ext uri="{91240B29-F687-4f45-9708-019B960494DF}">
-                <a14:hiddenLine xmlns="" xmlns:a14="http://schemas.microsoft.com/office/drawing/2010/main" w="9525">
+                <a14:hiddenLine xmlns:a14="http://schemas.microsoft.com/office/drawing/2010/main" xmlns="" w="9525">
                   <a:solidFill>
                     <a:srgbClr val="000000"/>
                   </a:solidFill>
@@ -1374,7 +1377,7 @@
             </a:ln>
             <a:extLst>
               <a:ext uri="{91240B29-F687-4f45-9708-019B960494DF}">
-                <a14:hiddenLine xmlns="" xmlns:a14="http://schemas.microsoft.com/office/drawing/2010/main" w="9525">
+                <a14:hiddenLine xmlns:a14="http://schemas.microsoft.com/office/drawing/2010/main" xmlns="" w="9525">
                   <a:solidFill>
                     <a:srgbClr val="000000"/>
                   </a:solidFill>
@@ -1464,7 +1467,7 @@
             </a:ln>
             <a:extLst>
               <a:ext uri="{91240B29-F687-4f45-9708-019B960494DF}">
-                <a14:hiddenLine xmlns="" xmlns:a14="http://schemas.microsoft.com/office/drawing/2010/main" w="9525">
+                <a14:hiddenLine xmlns:a14="http://schemas.microsoft.com/office/drawing/2010/main" xmlns="" w="9525">
                   <a:solidFill>
                     <a:srgbClr val="000000"/>
                   </a:solidFill>
@@ -1526,7 +1529,7 @@
             </a:ln>
             <a:extLst>
               <a:ext uri="{91240B29-F687-4f45-9708-019B960494DF}">
-                <a14:hiddenLine xmlns="" xmlns:a14="http://schemas.microsoft.com/office/drawing/2010/main" w="9525">
+                <a14:hiddenLine xmlns:a14="http://schemas.microsoft.com/office/drawing/2010/main" xmlns="" w="9525">
                   <a:solidFill>
                     <a:srgbClr val="000000"/>
                   </a:solidFill>
@@ -1616,7 +1619,7 @@
             </a:ln>
             <a:extLst>
               <a:ext uri="{91240B29-F687-4f45-9708-019B960494DF}">
-                <a14:hiddenLine xmlns="" xmlns:a14="http://schemas.microsoft.com/office/drawing/2010/main" w="9525">
+                <a14:hiddenLine xmlns:a14="http://schemas.microsoft.com/office/drawing/2010/main" xmlns="" w="9525">
                   <a:solidFill>
                     <a:srgbClr val="000000"/>
                   </a:solidFill>
@@ -1706,7 +1709,7 @@
             </a:ln>
             <a:extLst>
               <a:ext uri="{91240B29-F687-4f45-9708-019B960494DF}">
-                <a14:hiddenLine xmlns="" xmlns:a14="http://schemas.microsoft.com/office/drawing/2010/main" w="9525">
+                <a14:hiddenLine xmlns:a14="http://schemas.microsoft.com/office/drawing/2010/main" xmlns="" w="9525">
                   <a:solidFill>
                     <a:srgbClr val="000000"/>
                   </a:solidFill>
@@ -1762,7 +1765,7 @@
             </a:ln>
             <a:extLst>
               <a:ext uri="{91240B29-F687-4f45-9708-019B960494DF}">
-                <a14:hiddenLine xmlns="" xmlns:a14="http://schemas.microsoft.com/office/drawing/2010/main" w="9525">
+                <a14:hiddenLine xmlns:a14="http://schemas.microsoft.com/office/drawing/2010/main" xmlns="" w="9525">
                   <a:solidFill>
                     <a:srgbClr val="000000"/>
                   </a:solidFill>
@@ -1852,7 +1855,7 @@
             </a:ln>
             <a:extLst>
               <a:ext uri="{91240B29-F687-4f45-9708-019B960494DF}">
-                <a14:hiddenLine xmlns="" xmlns:a14="http://schemas.microsoft.com/office/drawing/2010/main" w="9525">
+                <a14:hiddenLine xmlns:a14="http://schemas.microsoft.com/office/drawing/2010/main" xmlns="" w="9525">
                   <a:solidFill>
                     <a:srgbClr val="000000"/>
                   </a:solidFill>
@@ -1908,7 +1911,7 @@
             </a:ln>
             <a:extLst>
               <a:ext uri="{91240B29-F687-4f45-9708-019B960494DF}">
-                <a14:hiddenLine xmlns="" xmlns:a14="http://schemas.microsoft.com/office/drawing/2010/main" w="9525">
+                <a14:hiddenLine xmlns:a14="http://schemas.microsoft.com/office/drawing/2010/main" xmlns="" w="9525">
                   <a:solidFill>
                     <a:srgbClr val="000000"/>
                   </a:solidFill>
@@ -1998,7 +2001,7 @@
             </a:ln>
             <a:extLst>
               <a:ext uri="{91240B29-F687-4f45-9708-019B960494DF}">
-                <a14:hiddenLine xmlns="" xmlns:a14="http://schemas.microsoft.com/office/drawing/2010/main" w="9525">
+                <a14:hiddenLine xmlns:a14="http://schemas.microsoft.com/office/drawing/2010/main" xmlns="" w="9525">
                   <a:solidFill>
                     <a:srgbClr val="000000"/>
                   </a:solidFill>
@@ -2066,7 +2069,7 @@
             </a:ln>
             <a:extLst>
               <a:ext uri="{91240B29-F687-4f45-9708-019B960494DF}">
-                <a14:hiddenLine xmlns="" xmlns:a14="http://schemas.microsoft.com/office/drawing/2010/main" w="9525">
+                <a14:hiddenLine xmlns:a14="http://schemas.microsoft.com/office/drawing/2010/main" xmlns="" w="9525">
                   <a:solidFill>
                     <a:srgbClr val="000000"/>
                   </a:solidFill>
@@ -2156,7 +2159,7 @@
             </a:ln>
             <a:extLst>
               <a:ext uri="{91240B29-F687-4f45-9708-019B960494DF}">
-                <a14:hiddenLine xmlns="" xmlns:a14="http://schemas.microsoft.com/office/drawing/2010/main" w="9525">
+                <a14:hiddenLine xmlns:a14="http://schemas.microsoft.com/office/drawing/2010/main" xmlns="" w="9525">
                   <a:solidFill>
                     <a:srgbClr val="000000"/>
                   </a:solidFill>
@@ -2224,7 +2227,7 @@
             </a:ln>
             <a:extLst>
               <a:ext uri="{91240B29-F687-4f45-9708-019B960494DF}">
-                <a14:hiddenLine xmlns="" xmlns:a14="http://schemas.microsoft.com/office/drawing/2010/main" w="9525">
+                <a14:hiddenLine xmlns:a14="http://schemas.microsoft.com/office/drawing/2010/main" xmlns="" w="9525">
                   <a:solidFill>
                     <a:srgbClr val="000000"/>
                   </a:solidFill>
@@ -2314,7 +2317,7 @@
             </a:ln>
             <a:extLst>
               <a:ext uri="{91240B29-F687-4f45-9708-019B960494DF}">
-                <a14:hiddenLine xmlns="" xmlns:a14="http://schemas.microsoft.com/office/drawing/2010/main" w="9525">
+                <a14:hiddenLine xmlns:a14="http://schemas.microsoft.com/office/drawing/2010/main" xmlns="" w="9525">
                   <a:solidFill>
                     <a:srgbClr val="000000"/>
                   </a:solidFill>
@@ -2348,7 +2351,7 @@
             </a:ln>
             <a:extLst>
               <a:ext uri="{91240B29-F687-4f45-9708-019B960494DF}">
-                <a14:hiddenLine xmlns="" xmlns:a14="http://schemas.microsoft.com/office/drawing/2010/main" w="9525">
+                <a14:hiddenLine xmlns:a14="http://schemas.microsoft.com/office/drawing/2010/main" xmlns="" w="9525">
                   <a:solidFill>
                     <a:srgbClr val="000000"/>
                   </a:solidFill>
@@ -2438,7 +2441,7 @@
             </a:ln>
             <a:extLst>
               <a:ext uri="{91240B29-F687-4f45-9708-019B960494DF}">
-                <a14:hiddenLine xmlns="" xmlns:a14="http://schemas.microsoft.com/office/drawing/2010/main" w="9525">
+                <a14:hiddenLine xmlns:a14="http://schemas.microsoft.com/office/drawing/2010/main" xmlns="" w="9525">
                   <a:solidFill>
                     <a:srgbClr val="000000"/>
                   </a:solidFill>
@@ -2500,7 +2503,7 @@
             </a:ln>
             <a:extLst>
               <a:ext uri="{91240B29-F687-4f45-9708-019B960494DF}">
-                <a14:hiddenLine xmlns="" xmlns:a14="http://schemas.microsoft.com/office/drawing/2010/main" w="9525">
+                <a14:hiddenLine xmlns:a14="http://schemas.microsoft.com/office/drawing/2010/main" xmlns="" w="9525">
                   <a:solidFill>
                     <a:srgbClr val="000000"/>
                   </a:solidFill>
@@ -2562,7 +2565,7 @@
             </a:ln>
             <a:extLst>
               <a:ext uri="{91240B29-F687-4f45-9708-019B960494DF}">
-                <a14:hiddenLine xmlns="" xmlns:a14="http://schemas.microsoft.com/office/drawing/2010/main" w="9525">
+                <a14:hiddenLine xmlns:a14="http://schemas.microsoft.com/office/drawing/2010/main" xmlns="" w="9525">
                   <a:solidFill>
                     <a:srgbClr val="000000"/>
                   </a:solidFill>
@@ -2652,7 +2655,7 @@
             </a:ln>
             <a:extLst>
               <a:ext uri="{91240B29-F687-4f45-9708-019B960494DF}">
-                <a14:hiddenLine xmlns="" xmlns:a14="http://schemas.microsoft.com/office/drawing/2010/main" w="9525">
+                <a14:hiddenLine xmlns:a14="http://schemas.microsoft.com/office/drawing/2010/main" xmlns="" w="9525">
                   <a:solidFill>
                     <a:srgbClr val="000000"/>
                   </a:solidFill>
@@ -2720,7 +2723,7 @@
             </a:ln>
             <a:extLst>
               <a:ext uri="{91240B29-F687-4f45-9708-019B960494DF}">
-                <a14:hiddenLine xmlns="" xmlns:a14="http://schemas.microsoft.com/office/drawing/2010/main" w="9525">
+                <a14:hiddenLine xmlns:a14="http://schemas.microsoft.com/office/drawing/2010/main" xmlns="" w="9525">
                   <a:solidFill>
                     <a:srgbClr val="000000"/>
                   </a:solidFill>
@@ -2782,7 +2785,7 @@
             </a:ln>
             <a:extLst>
               <a:ext uri="{91240B29-F687-4f45-9708-019B960494DF}">
-                <a14:hiddenLine xmlns="" xmlns:a14="http://schemas.microsoft.com/office/drawing/2010/main" w="9525">
+                <a14:hiddenLine xmlns:a14="http://schemas.microsoft.com/office/drawing/2010/main" xmlns="" w="9525">
                   <a:solidFill>
                     <a:srgbClr val="000000"/>
                   </a:solidFill>
@@ -2872,7 +2875,7 @@
             </a:ln>
             <a:extLst>
               <a:ext uri="{91240B29-F687-4f45-9708-019B960494DF}">
-                <a14:hiddenLine xmlns="" xmlns:a14="http://schemas.microsoft.com/office/drawing/2010/main" w="9525">
+                <a14:hiddenLine xmlns:a14="http://schemas.microsoft.com/office/drawing/2010/main" xmlns="" w="9525">
                   <a:solidFill>
                     <a:srgbClr val="000000"/>
                   </a:solidFill>
@@ -2934,7 +2937,7 @@
             </a:ln>
             <a:extLst>
               <a:ext uri="{91240B29-F687-4f45-9708-019B960494DF}">
-                <a14:hiddenLine xmlns="" xmlns:a14="http://schemas.microsoft.com/office/drawing/2010/main" w="9525">
+                <a14:hiddenLine xmlns:a14="http://schemas.microsoft.com/office/drawing/2010/main" xmlns="" w="9525">
                   <a:solidFill>
                     <a:srgbClr val="000000"/>
                   </a:solidFill>
@@ -3024,7 +3027,7 @@
             </a:ln>
             <a:extLst>
               <a:ext uri="{91240B29-F687-4f45-9708-019B960494DF}">
-                <a14:hiddenLine xmlns="" xmlns:a14="http://schemas.microsoft.com/office/drawing/2010/main" w="9525">
+                <a14:hiddenLine xmlns:a14="http://schemas.microsoft.com/office/drawing/2010/main" xmlns="" w="9525">
                   <a:solidFill>
                     <a:srgbClr val="000000"/>
                   </a:solidFill>
@@ -3086,7 +3089,7 @@
             </a:ln>
             <a:extLst>
               <a:ext uri="{91240B29-F687-4f45-9708-019B960494DF}">
-                <a14:hiddenLine xmlns="" xmlns:a14="http://schemas.microsoft.com/office/drawing/2010/main" w="9525">
+                <a14:hiddenLine xmlns:a14="http://schemas.microsoft.com/office/drawing/2010/main" xmlns="" w="9525">
                   <a:solidFill>
                     <a:srgbClr val="000000"/>
                   </a:solidFill>
@@ -3176,7 +3179,7 @@
             </a:ln>
             <a:extLst>
               <a:ext uri="{91240B29-F687-4f45-9708-019B960494DF}">
-                <a14:hiddenLine xmlns="" xmlns:a14="http://schemas.microsoft.com/office/drawing/2010/main" w="9525">
+                <a14:hiddenLine xmlns:a14="http://schemas.microsoft.com/office/drawing/2010/main" xmlns="" w="9525">
                   <a:solidFill>
                     <a:srgbClr val="000000"/>
                   </a:solidFill>
@@ -3210,7 +3213,7 @@
             </a:ln>
             <a:extLst>
               <a:ext uri="{91240B29-F687-4f45-9708-019B960494DF}">
-                <a14:hiddenLine xmlns="" xmlns:a14="http://schemas.microsoft.com/office/drawing/2010/main" w="9525">
+                <a14:hiddenLine xmlns:a14="http://schemas.microsoft.com/office/drawing/2010/main" xmlns="" w="9525">
                   <a:solidFill>
                     <a:srgbClr val="000000"/>
                   </a:solidFill>
@@ -3275,7 +3278,7 @@
             </a:ln>
             <a:extLst>
               <a:ext uri="{91240B29-F687-4f45-9708-019B960494DF}">
-                <a14:hiddenLine xmlns="" xmlns:a14="http://schemas.microsoft.com/office/drawing/2010/main" w="9525">
+                <a14:hiddenLine xmlns:a14="http://schemas.microsoft.com/office/drawing/2010/main" xmlns="" w="9525">
                   <a:solidFill>
                     <a:srgbClr val="000000"/>
                   </a:solidFill>
@@ -3365,7 +3368,7 @@
             </a:ln>
             <a:extLst>
               <a:ext uri="{91240B29-F687-4f45-9708-019B960494DF}">
-                <a14:hiddenLine xmlns="" xmlns:a14="http://schemas.microsoft.com/office/drawing/2010/main" w="9525">
+                <a14:hiddenLine xmlns:a14="http://schemas.microsoft.com/office/drawing/2010/main" xmlns="" w="9525">
                   <a:solidFill>
                     <a:srgbClr val="000000"/>
                   </a:solidFill>
@@ -3427,7 +3430,7 @@
             </a:ln>
             <a:extLst>
               <a:ext uri="{91240B29-F687-4f45-9708-019B960494DF}">
-                <a14:hiddenLine xmlns="" xmlns:a14="http://schemas.microsoft.com/office/drawing/2010/main" w="9525">
+                <a14:hiddenLine xmlns:a14="http://schemas.microsoft.com/office/drawing/2010/main" xmlns="" w="9525">
                   <a:solidFill>
                     <a:srgbClr val="000000"/>
                   </a:solidFill>
@@ -3517,7 +3520,7 @@
             </a:ln>
             <a:extLst>
               <a:ext uri="{91240B29-F687-4f45-9708-019B960494DF}">
-                <a14:hiddenLine xmlns="" xmlns:a14="http://schemas.microsoft.com/office/drawing/2010/main" w="9525">
+                <a14:hiddenLine xmlns:a14="http://schemas.microsoft.com/office/drawing/2010/main" xmlns="" w="9525">
                   <a:solidFill>
                     <a:srgbClr val="000000"/>
                   </a:solidFill>
@@ -3607,7 +3610,7 @@
             </a:ln>
             <a:extLst>
               <a:ext uri="{91240B29-F687-4f45-9708-019B960494DF}">
-                <a14:hiddenLine xmlns="" xmlns:a14="http://schemas.microsoft.com/office/drawing/2010/main" w="9525">
+                <a14:hiddenLine xmlns:a14="http://schemas.microsoft.com/office/drawing/2010/main" xmlns="" w="9525">
                   <a:solidFill>
                     <a:srgbClr val="000000"/>
                   </a:solidFill>
@@ -3672,7 +3675,7 @@
             </a:ln>
             <a:extLst>
               <a:ext uri="{91240B29-F687-4f45-9708-019B960494DF}">
-                <a14:hiddenLine xmlns="" xmlns:a14="http://schemas.microsoft.com/office/drawing/2010/main" w="9525">
+                <a14:hiddenLine xmlns:a14="http://schemas.microsoft.com/office/drawing/2010/main" xmlns="" w="9525">
                   <a:solidFill>
                     <a:srgbClr val="000000"/>
                   </a:solidFill>
@@ -3734,7 +3737,7 @@
             </a:ln>
             <a:extLst>
               <a:ext uri="{91240B29-F687-4f45-9708-019B960494DF}">
-                <a14:hiddenLine xmlns="" xmlns:a14="http://schemas.microsoft.com/office/drawing/2010/main" w="9525">
+                <a14:hiddenLine xmlns:a14="http://schemas.microsoft.com/office/drawing/2010/main" xmlns="" w="9525">
                   <a:solidFill>
                     <a:srgbClr val="000000"/>
                   </a:solidFill>
@@ -3824,7 +3827,7 @@
             </a:ln>
             <a:extLst>
               <a:ext uri="{91240B29-F687-4f45-9708-019B960494DF}">
-                <a14:hiddenLine xmlns="" xmlns:a14="http://schemas.microsoft.com/office/drawing/2010/main" w="9525">
+                <a14:hiddenLine xmlns:a14="http://schemas.microsoft.com/office/drawing/2010/main" xmlns="" w="9525">
                   <a:solidFill>
                     <a:srgbClr val="000000"/>
                   </a:solidFill>
@@ -3914,7 +3917,7 @@
             </a:ln>
             <a:extLst>
               <a:ext uri="{91240B29-F687-4f45-9708-019B960494DF}">
-                <a14:hiddenLine xmlns="" xmlns:a14="http://schemas.microsoft.com/office/drawing/2010/main" w="9525">
+                <a14:hiddenLine xmlns:a14="http://schemas.microsoft.com/office/drawing/2010/main" xmlns="" w="9525">
                   <a:solidFill>
                     <a:srgbClr val="000000"/>
                   </a:solidFill>
@@ -3976,7 +3979,7 @@
             </a:ln>
             <a:extLst>
               <a:ext uri="{91240B29-F687-4f45-9708-019B960494DF}">
-                <a14:hiddenLine xmlns="" xmlns:a14="http://schemas.microsoft.com/office/drawing/2010/main" w="9525">
+                <a14:hiddenLine xmlns:a14="http://schemas.microsoft.com/office/drawing/2010/main" xmlns="" w="9525">
                   <a:solidFill>
                     <a:srgbClr val="000000"/>
                   </a:solidFill>
@@ -4096,7 +4099,7 @@
             </a:ln>
             <a:extLst>
               <a:ext uri="{91240B29-F687-4f45-9708-019B960494DF}">
-                <a14:hiddenLine xmlns="" xmlns:a14="http://schemas.microsoft.com/office/drawing/2010/main" w="9525">
+                <a14:hiddenLine xmlns:a14="http://schemas.microsoft.com/office/drawing/2010/main" xmlns="" w="9525">
                   <a:solidFill>
                     <a:srgbClr val="000000"/>
                   </a:solidFill>
@@ -4164,7 +4167,7 @@
             </a:ln>
             <a:extLst>
               <a:ext uri="{91240B29-F687-4f45-9708-019B960494DF}">
-                <a14:hiddenLine xmlns="" xmlns:a14="http://schemas.microsoft.com/office/drawing/2010/main" w="9525">
+                <a14:hiddenLine xmlns:a14="http://schemas.microsoft.com/office/drawing/2010/main" xmlns="" w="9525">
                   <a:solidFill>
                     <a:srgbClr val="000000"/>
                   </a:solidFill>
@@ -4254,7 +4257,7 @@
             </a:ln>
             <a:extLst>
               <a:ext uri="{91240B29-F687-4f45-9708-019B960494DF}">
-                <a14:hiddenLine xmlns="" xmlns:a14="http://schemas.microsoft.com/office/drawing/2010/main" w="9525">
+                <a14:hiddenLine xmlns:a14="http://schemas.microsoft.com/office/drawing/2010/main" xmlns="" w="9525">
                   <a:solidFill>
                     <a:srgbClr val="000000"/>
                   </a:solidFill>
@@ -8976,7 +8979,7 @@
           <a:noFill/>
           <a:extLst>
             <a:ext uri="{909E8E84-426E-40dd-AFC4-6F175D3DCCD1}">
-              <a14:hiddenFill xmlns="" xmlns:a14="http://schemas.microsoft.com/office/drawing/2010/main">
+              <a14:hiddenFill xmlns:a14="http://schemas.microsoft.com/office/drawing/2010/main" xmlns="">
                 <a:solidFill>
                   <a:srgbClr val="FFFFFF"/>
                 </a:solidFill>
@@ -9050,7 +9053,7 @@
               </a:ln>
               <a:extLst>
                 <a:ext uri="{91240B29-F687-4f45-9708-019B960494DF}">
-                  <a14:hiddenLine xmlns="" xmlns:a14="http://schemas.microsoft.com/office/drawing/2010/main" w="9525">
+                  <a14:hiddenLine xmlns:a14="http://schemas.microsoft.com/office/drawing/2010/main" xmlns="" w="9525">
                     <a:solidFill>
                       <a:srgbClr val="000000"/>
                     </a:solidFill>
@@ -9140,7 +9143,7 @@
               </a:ln>
               <a:extLst>
                 <a:ext uri="{91240B29-F687-4f45-9708-019B960494DF}">
-                  <a14:hiddenLine xmlns="" xmlns:a14="http://schemas.microsoft.com/office/drawing/2010/main" w="9525">
+                  <a14:hiddenLine xmlns:a14="http://schemas.microsoft.com/office/drawing/2010/main" xmlns="" w="9525">
                     <a:solidFill>
                       <a:srgbClr val="000000"/>
                     </a:solidFill>
@@ -9230,7 +9233,7 @@
               </a:ln>
               <a:extLst>
                 <a:ext uri="{91240B29-F687-4f45-9708-019B960494DF}">
-                  <a14:hiddenLine xmlns="" xmlns:a14="http://schemas.microsoft.com/office/drawing/2010/main" w="9525">
+                  <a14:hiddenLine xmlns:a14="http://schemas.microsoft.com/office/drawing/2010/main" xmlns="" w="9525">
                     <a:solidFill>
                       <a:srgbClr val="000000"/>
                     </a:solidFill>
@@ -9292,7 +9295,7 @@
               </a:ln>
               <a:extLst>
                 <a:ext uri="{91240B29-F687-4f45-9708-019B960494DF}">
-                  <a14:hiddenLine xmlns="" xmlns:a14="http://schemas.microsoft.com/office/drawing/2010/main" w="9525">
+                  <a14:hiddenLine xmlns:a14="http://schemas.microsoft.com/office/drawing/2010/main" xmlns="" w="9525">
                     <a:solidFill>
                       <a:srgbClr val="000000"/>
                     </a:solidFill>
@@ -9382,7 +9385,7 @@
               </a:ln>
               <a:extLst>
                 <a:ext uri="{91240B29-F687-4f45-9708-019B960494DF}">
-                  <a14:hiddenLine xmlns="" xmlns:a14="http://schemas.microsoft.com/office/drawing/2010/main" w="9525">
+                  <a14:hiddenLine xmlns:a14="http://schemas.microsoft.com/office/drawing/2010/main" xmlns="" w="9525">
                     <a:solidFill>
                       <a:srgbClr val="000000"/>
                     </a:solidFill>
@@ -9444,7 +9447,7 @@
               </a:ln>
               <a:extLst>
                 <a:ext uri="{91240B29-F687-4f45-9708-019B960494DF}">
-                  <a14:hiddenLine xmlns="" xmlns:a14="http://schemas.microsoft.com/office/drawing/2010/main" w="9525">
+                  <a14:hiddenLine xmlns:a14="http://schemas.microsoft.com/office/drawing/2010/main" xmlns="" w="9525">
                     <a:solidFill>
                       <a:srgbClr val="000000"/>
                     </a:solidFill>
@@ -9506,7 +9509,7 @@
               </a:ln>
               <a:extLst>
                 <a:ext uri="{91240B29-F687-4f45-9708-019B960494DF}">
-                  <a14:hiddenLine xmlns="" xmlns:a14="http://schemas.microsoft.com/office/drawing/2010/main" w="9525">
+                  <a14:hiddenLine xmlns:a14="http://schemas.microsoft.com/office/drawing/2010/main" xmlns="" w="9525">
                     <a:solidFill>
                       <a:srgbClr val="000000"/>
                     </a:solidFill>
@@ -9596,7 +9599,7 @@
               </a:ln>
               <a:extLst>
                 <a:ext uri="{91240B29-F687-4f45-9708-019B960494DF}">
-                  <a14:hiddenLine xmlns="" xmlns:a14="http://schemas.microsoft.com/office/drawing/2010/main" w="9525">
+                  <a14:hiddenLine xmlns:a14="http://schemas.microsoft.com/office/drawing/2010/main" xmlns="" w="9525">
                     <a:solidFill>
                       <a:srgbClr val="000000"/>
                     </a:solidFill>
@@ -9686,7 +9689,7 @@
               </a:ln>
               <a:extLst>
                 <a:ext uri="{91240B29-F687-4f45-9708-019B960494DF}">
-                  <a14:hiddenLine xmlns="" xmlns:a14="http://schemas.microsoft.com/office/drawing/2010/main" w="9525">
+                  <a14:hiddenLine xmlns:a14="http://schemas.microsoft.com/office/drawing/2010/main" xmlns="" w="9525">
                     <a:solidFill>
                       <a:srgbClr val="000000"/>
                     </a:solidFill>
@@ -9748,7 +9751,7 @@
               </a:ln>
               <a:extLst>
                 <a:ext uri="{91240B29-F687-4f45-9708-019B960494DF}">
-                  <a14:hiddenLine xmlns="" xmlns:a14="http://schemas.microsoft.com/office/drawing/2010/main" w="9525">
+                  <a14:hiddenLine xmlns:a14="http://schemas.microsoft.com/office/drawing/2010/main" xmlns="" w="9525">
                     <a:solidFill>
                       <a:srgbClr val="000000"/>
                     </a:solidFill>
@@ -9858,7 +9861,7 @@
               </a:ln>
               <a:extLst>
                 <a:ext uri="{91240B29-F687-4f45-9708-019B960494DF}">
-                  <a14:hiddenLine xmlns="" xmlns:a14="http://schemas.microsoft.com/office/drawing/2010/main" w="9525">
+                  <a14:hiddenLine xmlns:a14="http://schemas.microsoft.com/office/drawing/2010/main" xmlns="" w="9525">
                     <a:solidFill>
                       <a:srgbClr val="000000"/>
                     </a:solidFill>
@@ -9942,7 +9945,7 @@
               </a:ln>
               <a:extLst>
                 <a:ext uri="{91240B29-F687-4f45-9708-019B960494DF}">
-                  <a14:hiddenLine xmlns="" xmlns:a14="http://schemas.microsoft.com/office/drawing/2010/main" w="9525">
+                  <a14:hiddenLine xmlns:a14="http://schemas.microsoft.com/office/drawing/2010/main" xmlns="" w="9525">
                     <a:solidFill>
                       <a:srgbClr val="000000"/>
                     </a:solidFill>
@@ -10004,7 +10007,7 @@
               </a:ln>
               <a:extLst>
                 <a:ext uri="{91240B29-F687-4f45-9708-019B960494DF}">
-                  <a14:hiddenLine xmlns="" xmlns:a14="http://schemas.microsoft.com/office/drawing/2010/main" w="9525">
+                  <a14:hiddenLine xmlns:a14="http://schemas.microsoft.com/office/drawing/2010/main" xmlns="" w="9525">
                     <a:solidFill>
                       <a:srgbClr val="000000"/>
                     </a:solidFill>
@@ -10066,7 +10069,7 @@
               </a:ln>
               <a:extLst>
                 <a:ext uri="{91240B29-F687-4f45-9708-019B960494DF}">
-                  <a14:hiddenLine xmlns="" xmlns:a14="http://schemas.microsoft.com/office/drawing/2010/main" w="9525">
+                  <a14:hiddenLine xmlns:a14="http://schemas.microsoft.com/office/drawing/2010/main" xmlns="" w="9525">
                     <a:solidFill>
                       <a:srgbClr val="000000"/>
                     </a:solidFill>
@@ -10156,7 +10159,7 @@
               </a:ln>
               <a:extLst>
                 <a:ext uri="{91240B29-F687-4f45-9708-019B960494DF}">
-                  <a14:hiddenLine xmlns="" xmlns:a14="http://schemas.microsoft.com/office/drawing/2010/main" w="9525">
+                  <a14:hiddenLine xmlns:a14="http://schemas.microsoft.com/office/drawing/2010/main" xmlns="" w="9525">
                     <a:solidFill>
                       <a:srgbClr val="000000"/>
                     </a:solidFill>
@@ -10190,7 +10193,7 @@
               </a:ln>
               <a:extLst>
                 <a:ext uri="{91240B29-F687-4f45-9708-019B960494DF}">
-                  <a14:hiddenLine xmlns="" xmlns:a14="http://schemas.microsoft.com/office/drawing/2010/main" w="9525">
+                  <a14:hiddenLine xmlns:a14="http://schemas.microsoft.com/office/drawing/2010/main" xmlns="" w="9525">
                     <a:solidFill>
                       <a:srgbClr val="000000"/>
                     </a:solidFill>
@@ -10255,7 +10258,7 @@
               </a:ln>
               <a:extLst>
                 <a:ext uri="{91240B29-F687-4f45-9708-019B960494DF}">
-                  <a14:hiddenLine xmlns="" xmlns:a14="http://schemas.microsoft.com/office/drawing/2010/main" w="9525">
+                  <a14:hiddenLine xmlns:a14="http://schemas.microsoft.com/office/drawing/2010/main" xmlns="" w="9525">
                     <a:solidFill>
                       <a:srgbClr val="000000"/>
                     </a:solidFill>
@@ -10345,7 +10348,7 @@
               </a:ln>
               <a:extLst>
                 <a:ext uri="{91240B29-F687-4f45-9708-019B960494DF}">
-                  <a14:hiddenLine xmlns="" xmlns:a14="http://schemas.microsoft.com/office/drawing/2010/main" w="9525">
+                  <a14:hiddenLine xmlns:a14="http://schemas.microsoft.com/office/drawing/2010/main" xmlns="" w="9525">
                     <a:solidFill>
                       <a:srgbClr val="000000"/>
                     </a:solidFill>
@@ -10407,7 +10410,7 @@
               </a:ln>
               <a:extLst>
                 <a:ext uri="{91240B29-F687-4f45-9708-019B960494DF}">
-                  <a14:hiddenLine xmlns="" xmlns:a14="http://schemas.microsoft.com/office/drawing/2010/main" w="9525">
+                  <a14:hiddenLine xmlns:a14="http://schemas.microsoft.com/office/drawing/2010/main" xmlns="" w="9525">
                     <a:solidFill>
                       <a:srgbClr val="000000"/>
                     </a:solidFill>
@@ -10497,7 +10500,7 @@
               </a:ln>
               <a:extLst>
                 <a:ext uri="{91240B29-F687-4f45-9708-019B960494DF}">
-                  <a14:hiddenLine xmlns="" xmlns:a14="http://schemas.microsoft.com/office/drawing/2010/main" w="9525">
+                  <a14:hiddenLine xmlns:a14="http://schemas.microsoft.com/office/drawing/2010/main" xmlns="" w="9525">
                     <a:solidFill>
                       <a:srgbClr val="000000"/>
                     </a:solidFill>
@@ -10562,7 +10565,7 @@
               </a:ln>
               <a:extLst>
                 <a:ext uri="{91240B29-F687-4f45-9708-019B960494DF}">
-                  <a14:hiddenLine xmlns="" xmlns:a14="http://schemas.microsoft.com/office/drawing/2010/main" w="9525">
+                  <a14:hiddenLine xmlns:a14="http://schemas.microsoft.com/office/drawing/2010/main" xmlns="" w="9525">
                     <a:solidFill>
                       <a:srgbClr val="000000"/>
                     </a:solidFill>
@@ -10624,7 +10627,7 @@
               </a:ln>
               <a:extLst>
                 <a:ext uri="{91240B29-F687-4f45-9708-019B960494DF}">
-                  <a14:hiddenLine xmlns="" xmlns:a14="http://schemas.microsoft.com/office/drawing/2010/main" w="9525">
+                  <a14:hiddenLine xmlns:a14="http://schemas.microsoft.com/office/drawing/2010/main" xmlns="" w="9525">
                     <a:solidFill>
                       <a:srgbClr val="000000"/>
                     </a:solidFill>
@@ -10714,7 +10717,7 @@
               </a:ln>
               <a:extLst>
                 <a:ext uri="{91240B29-F687-4f45-9708-019B960494DF}">
-                  <a14:hiddenLine xmlns="" xmlns:a14="http://schemas.microsoft.com/office/drawing/2010/main" w="9525">
+                  <a14:hiddenLine xmlns:a14="http://schemas.microsoft.com/office/drawing/2010/main" xmlns="" w="9525">
                     <a:solidFill>
                       <a:srgbClr val="000000"/>
                     </a:solidFill>
@@ -10804,7 +10807,7 @@
               </a:ln>
               <a:extLst>
                 <a:ext uri="{91240B29-F687-4f45-9708-019B960494DF}">
-                  <a14:hiddenLine xmlns="" xmlns:a14="http://schemas.microsoft.com/office/drawing/2010/main" w="9525">
+                  <a14:hiddenLine xmlns:a14="http://schemas.microsoft.com/office/drawing/2010/main" xmlns="" w="9525">
                     <a:solidFill>
                       <a:srgbClr val="000000"/>
                     </a:solidFill>
@@ -10869,7 +10872,7 @@
               </a:ln>
               <a:extLst>
                 <a:ext uri="{91240B29-F687-4f45-9708-019B960494DF}">
-                  <a14:hiddenLine xmlns="" xmlns:a14="http://schemas.microsoft.com/office/drawing/2010/main" w="9525">
+                  <a14:hiddenLine xmlns:a14="http://schemas.microsoft.com/office/drawing/2010/main" xmlns="" w="9525">
                     <a:solidFill>
                       <a:srgbClr val="000000"/>
                     </a:solidFill>
@@ -10989,7 +10992,7 @@
               </a:ln>
               <a:extLst>
                 <a:ext uri="{91240B29-F687-4f45-9708-019B960494DF}">
-                  <a14:hiddenLine xmlns="" xmlns:a14="http://schemas.microsoft.com/office/drawing/2010/main" w="9525">
+                  <a14:hiddenLine xmlns:a14="http://schemas.microsoft.com/office/drawing/2010/main" xmlns="" w="9525">
                     <a:solidFill>
                       <a:srgbClr val="000000"/>
                     </a:solidFill>
@@ -11087,7 +11090,7 @@
               </a:ln>
               <a:extLst>
                 <a:ext uri="{91240B29-F687-4f45-9708-019B960494DF}">
-                  <a14:hiddenLine xmlns="" xmlns:a14="http://schemas.microsoft.com/office/drawing/2010/main" w="9525">
+                  <a14:hiddenLine xmlns:a14="http://schemas.microsoft.com/office/drawing/2010/main" xmlns="" w="9525">
                     <a:solidFill>
                       <a:srgbClr val="000000"/>
                     </a:solidFill>
@@ -11202,7 +11205,7 @@
               </a:ln>
               <a:extLst>
                 <a:ext uri="{91240B29-F687-4f45-9708-019B960494DF}">
-                  <a14:hiddenLine xmlns="" xmlns:a14="http://schemas.microsoft.com/office/drawing/2010/main" w="9525">
+                  <a14:hiddenLine xmlns:a14="http://schemas.microsoft.com/office/drawing/2010/main" xmlns="" w="9525">
                     <a:solidFill>
                       <a:srgbClr val="000000"/>
                     </a:solidFill>
@@ -11292,7 +11295,7 @@
               </a:ln>
               <a:extLst>
                 <a:ext uri="{91240B29-F687-4f45-9708-019B960494DF}">
-                  <a14:hiddenLine xmlns="" xmlns:a14="http://schemas.microsoft.com/office/drawing/2010/main" w="9525">
+                  <a14:hiddenLine xmlns:a14="http://schemas.microsoft.com/office/drawing/2010/main" xmlns="" w="9525">
                     <a:solidFill>
                       <a:srgbClr val="000000"/>
                     </a:solidFill>
@@ -11357,7 +11360,7 @@
               </a:ln>
               <a:extLst>
                 <a:ext uri="{91240B29-F687-4f45-9708-019B960494DF}">
-                  <a14:hiddenLine xmlns="" xmlns:a14="http://schemas.microsoft.com/office/drawing/2010/main" w="9525">
+                  <a14:hiddenLine xmlns:a14="http://schemas.microsoft.com/office/drawing/2010/main" xmlns="" w="9525">
                     <a:solidFill>
                       <a:srgbClr val="000000"/>
                     </a:solidFill>
@@ -11447,7 +11450,7 @@
               </a:ln>
               <a:extLst>
                 <a:ext uri="{91240B29-F687-4f45-9708-019B960494DF}">
-                  <a14:hiddenLine xmlns="" xmlns:a14="http://schemas.microsoft.com/office/drawing/2010/main" w="9525">
+                  <a14:hiddenLine xmlns:a14="http://schemas.microsoft.com/office/drawing/2010/main" xmlns="" w="9525">
                     <a:solidFill>
                       <a:srgbClr val="000000"/>
                     </a:solidFill>
@@ -11515,7 +11518,7 @@
               </a:ln>
               <a:extLst>
                 <a:ext uri="{91240B29-F687-4f45-9708-019B960494DF}">
-                  <a14:hiddenLine xmlns="" xmlns:a14="http://schemas.microsoft.com/office/drawing/2010/main" w="9525">
+                  <a14:hiddenLine xmlns:a14="http://schemas.microsoft.com/office/drawing/2010/main" xmlns="" w="9525">
                     <a:solidFill>
                       <a:srgbClr val="000000"/>
                     </a:solidFill>
@@ -11605,7 +11608,7 @@
               </a:ln>
               <a:extLst>
                 <a:ext uri="{91240B29-F687-4f45-9708-019B960494DF}">
-                  <a14:hiddenLine xmlns="" xmlns:a14="http://schemas.microsoft.com/office/drawing/2010/main" w="9525">
+                  <a14:hiddenLine xmlns:a14="http://schemas.microsoft.com/office/drawing/2010/main" xmlns="" w="9525">
                     <a:solidFill>
                       <a:srgbClr val="000000"/>
                     </a:solidFill>
@@ -11673,7 +11676,7 @@
               </a:ln>
               <a:extLst>
                 <a:ext uri="{91240B29-F687-4f45-9708-019B960494DF}">
-                  <a14:hiddenLine xmlns="" xmlns:a14="http://schemas.microsoft.com/office/drawing/2010/main" w="9525">
+                  <a14:hiddenLine xmlns:a14="http://schemas.microsoft.com/office/drawing/2010/main" xmlns="" w="9525">
                     <a:solidFill>
                       <a:srgbClr val="000000"/>
                     </a:solidFill>
@@ -11763,7 +11766,7 @@
               </a:ln>
               <a:extLst>
                 <a:ext uri="{91240B29-F687-4f45-9708-019B960494DF}">
-                  <a14:hiddenLine xmlns="" xmlns:a14="http://schemas.microsoft.com/office/drawing/2010/main" w="9525">
+                  <a14:hiddenLine xmlns:a14="http://schemas.microsoft.com/office/drawing/2010/main" xmlns="" w="9525">
                     <a:solidFill>
                       <a:srgbClr val="000000"/>
                     </a:solidFill>
@@ -11797,7 +11800,7 @@
               </a:ln>
               <a:extLst>
                 <a:ext uri="{91240B29-F687-4f45-9708-019B960494DF}">
-                  <a14:hiddenLine xmlns="" xmlns:a14="http://schemas.microsoft.com/office/drawing/2010/main" w="9525">
+                  <a14:hiddenLine xmlns:a14="http://schemas.microsoft.com/office/drawing/2010/main" xmlns="" w="9525">
                     <a:solidFill>
                       <a:srgbClr val="000000"/>
                     </a:solidFill>
@@ -12434,6 +12437,143 @@
   <p:clrMapOvr>
     <a:masterClrMapping/>
   </p:clrMapOvr>
+  <p:timing>
+    <p:tnLst>
+      <p:par>
+        <p:cTn id="1" dur="indefinite" restart="never" nodeType="tmRoot"/>
+      </p:par>
+    </p:tnLst>
+  </p:timing>
+</p:sld>
+</file>
+
+<file path=ppt/slides/slide10.xml><?xml version="1.0" encoding="utf-8"?>
+<p:sld xmlns:a="http://schemas.openxmlformats.org/drawingml/2006/main" xmlns:r="http://schemas.openxmlformats.org/officeDocument/2006/relationships" xmlns:p="http://schemas.openxmlformats.org/presentationml/2006/main">
+  <p:cSld>
+    <p:spTree>
+      <p:nvGrpSpPr>
+        <p:cNvPr id="1" name=""/>
+        <p:cNvGrpSpPr/>
+        <p:nvPr/>
+      </p:nvGrpSpPr>
+      <p:grpSpPr>
+        <a:xfrm>
+          <a:off x="0" y="0"/>
+          <a:ext cx="0" cy="0"/>
+          <a:chOff x="0" y="0"/>
+          <a:chExt cx="0" cy="0"/>
+        </a:xfrm>
+      </p:grpSpPr>
+      <p:sp>
+        <p:nvSpPr>
+          <p:cNvPr id="2" name="Titre 1"/>
+          <p:cNvSpPr>
+            <a:spLocks noGrp="1"/>
+          </p:cNvSpPr>
+          <p:nvPr>
+            <p:ph type="title"/>
+          </p:nvPr>
+        </p:nvSpPr>
+        <p:spPr/>
+        <p:txBody>
+          <a:bodyPr/>
+          <a:lstStyle/>
+          <a:p>
+            <a:pPr algn="ctr"/>
+            <a:r>
+              <a:rPr lang="fr-CH" dirty="0" smtClean="0"/>
+              <a:t>QUESIONS ? </a:t>
+            </a:r>
+            <a:endParaRPr lang="fr-CH" dirty="0"/>
+          </a:p>
+        </p:txBody>
+      </p:sp>
+      <p:sp>
+        <p:nvSpPr>
+          <p:cNvPr id="4" name="AutoShape 2" descr="Image result for questions png"/>
+          <p:cNvSpPr>
+            <a:spLocks noChangeAspect="1" noChangeArrowheads="1"/>
+          </p:cNvSpPr>
+          <p:nvPr/>
+        </p:nvSpPr>
+        <p:spPr bwMode="auto">
+          <a:xfrm>
+            <a:off x="155575" y="-144463"/>
+            <a:ext cx="304800" cy="304801"/>
+          </a:xfrm>
+          <a:prstGeom prst="rect">
+            <a:avLst/>
+          </a:prstGeom>
+          <a:noFill/>
+          <a:extLst>
+            <a:ext uri="{909E8E84-426E-40DD-AFC4-6F175D3DCCD1}">
+              <a14:hiddenFill xmlns:a14="http://schemas.microsoft.com/office/drawing/2010/main">
+                <a:solidFill>
+                  <a:srgbClr val="FFFFFF"/>
+                </a:solidFill>
+              </a14:hiddenFill>
+            </a:ext>
+          </a:extLst>
+        </p:spPr>
+        <p:txBody>
+          <a:bodyPr vert="horz" wrap="square" lIns="91440" tIns="45720" rIns="91440" bIns="45720" numCol="1" anchor="t" anchorCtr="0" compatLnSpc="1">
+            <a:prstTxWarp prst="textNoShape">
+              <a:avLst/>
+            </a:prstTxWarp>
+          </a:bodyPr>
+          <a:lstStyle/>
+          <a:p>
+            <a:endParaRPr lang="fr-CH"/>
+          </a:p>
+        </p:txBody>
+      </p:sp>
+      <p:pic>
+        <p:nvPicPr>
+          <p:cNvPr id="6" name="Image 5"/>
+          <p:cNvPicPr>
+            <a:picLocks noChangeAspect="1"/>
+          </p:cNvPicPr>
+          <p:nvPr/>
+        </p:nvPicPr>
+        <p:blipFill>
+          <a:blip r:embed="rId2">
+            <a:extLst>
+              <a:ext uri="{28A0092B-C50C-407E-A947-70E740481C1C}">
+                <a14:useLocalDpi xmlns:a14="http://schemas.microsoft.com/office/drawing/2010/main" val="0"/>
+              </a:ext>
+            </a:extLst>
+          </a:blip>
+          <a:stretch>
+            <a:fillRect/>
+          </a:stretch>
+        </p:blipFill>
+        <p:spPr>
+          <a:xfrm>
+            <a:off x="3710491" y="2236124"/>
+            <a:ext cx="4767842" cy="2907221"/>
+          </a:xfrm>
+          <a:prstGeom prst="rect">
+            <a:avLst/>
+          </a:prstGeom>
+        </p:spPr>
+      </p:pic>
+    </p:spTree>
+    <p:extLst>
+      <p:ext uri="{BB962C8B-B14F-4D97-AF65-F5344CB8AC3E}">
+        <p14:creationId xmlns:p14="http://schemas.microsoft.com/office/powerpoint/2010/main" val="3823780413"/>
+      </p:ext>
+    </p:extLst>
+  </p:cSld>
+  <p:clrMapOvr>
+    <a:masterClrMapping/>
+  </p:clrMapOvr>
+  <p:timing>
+    <p:tnLst>
+      <p:par>
+        <p:cTn id="1" dur="indefinite" restart="never" nodeType="tmRoot"/>
+      </p:par>
+    </p:tnLst>
+  </p:timing>
 </p:sld>
 </file>
 
@@ -12552,6 +12692,13 @@
   <p:clrMapOvr>
     <a:masterClrMapping/>
   </p:clrMapOvr>
+  <p:timing>
+    <p:tnLst>
+      <p:par>
+        <p:cTn id="1" dur="indefinite" restart="never" nodeType="tmRoot"/>
+      </p:par>
+    </p:tnLst>
+  </p:timing>
 </p:sld>
 </file>
 
@@ -12634,6 +12781,13 @@
   <p:clrMapOvr>
     <a:masterClrMapping/>
   </p:clrMapOvr>
+  <p:timing>
+    <p:tnLst>
+      <p:par>
+        <p:cTn id="1" dur="indefinite" restart="never" nodeType="tmRoot"/>
+      </p:par>
+    </p:tnLst>
+  </p:timing>
 </p:sld>
 </file>
 
@@ -12671,31 +12825,71 @@
           <a:p>
             <a:r>
               <a:rPr lang="fr-CH" dirty="0" smtClean="0"/>
-              <a:t>Respect du planning ?</a:t>
+              <a:t>Respect du planning </a:t>
             </a:r>
             <a:endParaRPr lang="fr-CH" dirty="0"/>
           </a:p>
         </p:txBody>
       </p:sp>
-      <p:sp>
-        <p:nvSpPr>
-          <p:cNvPr id="3" name="Espace réservé du contenu 2"/>
-          <p:cNvSpPr>
-            <a:spLocks noGrp="1"/>
-          </p:cNvSpPr>
+      <p:pic>
+        <p:nvPicPr>
+          <p:cNvPr id="4" name="Espace réservé du contenu 3"/>
+          <p:cNvPicPr>
+            <a:picLocks noGrp="1" noChangeAspect="1"/>
+          </p:cNvPicPr>
           <p:nvPr>
             <p:ph idx="1"/>
           </p:nvPr>
-        </p:nvSpPr>
-        <p:spPr/>
-        <p:txBody>
-          <a:bodyPr/>
-          <a:lstStyle/>
-          <a:p>
-            <a:endParaRPr lang="fr-CH" dirty="0"/>
-          </a:p>
-        </p:txBody>
-      </p:sp>
+        </p:nvPicPr>
+        <p:blipFill>
+          <a:blip r:embed="rId2">
+            <a:extLst>
+              <a:ext uri="{28A0092B-C50C-407E-A947-70E740481C1C}">
+                <a14:useLocalDpi xmlns:a14="http://schemas.microsoft.com/office/drawing/2010/main" val="0"/>
+              </a:ext>
+            </a:extLst>
+          </a:blip>
+          <a:stretch>
+            <a:fillRect/>
+          </a:stretch>
+        </p:blipFill>
+        <p:spPr>
+          <a:xfrm>
+            <a:off x="310796" y="1794817"/>
+            <a:ext cx="11567232" cy="2589291"/>
+          </a:xfrm>
+        </p:spPr>
+      </p:pic>
+      <p:pic>
+        <p:nvPicPr>
+          <p:cNvPr id="5" name="Image 4"/>
+          <p:cNvPicPr>
+            <a:picLocks noChangeAspect="1"/>
+          </p:cNvPicPr>
+          <p:nvPr/>
+        </p:nvPicPr>
+        <p:blipFill>
+          <a:blip r:embed="rId3">
+            <a:extLst>
+              <a:ext uri="{28A0092B-C50C-407E-A947-70E740481C1C}">
+                <a14:useLocalDpi xmlns:a14="http://schemas.microsoft.com/office/drawing/2010/main" val="0"/>
+              </a:ext>
+            </a:extLst>
+          </a:blip>
+          <a:stretch>
+            <a:fillRect/>
+          </a:stretch>
+        </p:blipFill>
+        <p:spPr>
+          <a:xfrm>
+            <a:off x="310797" y="4384108"/>
+            <a:ext cx="11567232" cy="2066505"/>
+          </a:xfrm>
+          <a:prstGeom prst="rect">
+            <a:avLst/>
+          </a:prstGeom>
+        </p:spPr>
+      </p:pic>
     </p:spTree>
     <p:extLst>
       <p:ext uri="{BB962C8B-B14F-4D97-AF65-F5344CB8AC3E}">
@@ -12706,6 +12900,13 @@
   <p:clrMapOvr>
     <a:masterClrMapping/>
   </p:clrMapOvr>
+  <p:timing>
+    <p:tnLst>
+      <p:par>
+        <p:cTn id="1" dur="indefinite" restart="never" nodeType="tmRoot"/>
+      </p:par>
+    </p:tnLst>
+  </p:timing>
 </p:sld>
 </file>
 
@@ -12742,42 +12943,88 @@
           <a:lstStyle/>
           <a:p>
             <a:r>
-              <a:rPr lang="fr-CH" dirty="0" smtClean="0"/>
-              <a:t>Fiertés et complications</a:t>
+              <a:rPr lang="fr-CH" dirty="0"/>
+              <a:t>Respect du planning </a:t>
             </a:r>
-            <a:endParaRPr lang="fr-CH" dirty="0"/>
           </a:p>
         </p:txBody>
       </p:sp>
-      <p:sp>
-        <p:nvSpPr>
-          <p:cNvPr id="3" name="Espace réservé du contenu 2"/>
-          <p:cNvSpPr>
-            <a:spLocks noGrp="1"/>
-          </p:cNvSpPr>
+      <p:pic>
+        <p:nvPicPr>
+          <p:cNvPr id="4" name="Espace réservé du contenu 3"/>
+          <p:cNvPicPr>
+            <a:picLocks noGrp="1" noChangeAspect="1"/>
+          </p:cNvPicPr>
           <p:nvPr>
             <p:ph idx="1"/>
           </p:nvPr>
-        </p:nvSpPr>
-        <p:spPr/>
-        <p:txBody>
-          <a:bodyPr/>
-          <a:lstStyle/>
-          <a:p>
-            <a:endParaRPr lang="fr-CH" dirty="0"/>
-          </a:p>
-        </p:txBody>
-      </p:sp>
+        </p:nvPicPr>
+        <p:blipFill>
+          <a:blip r:embed="rId2">
+            <a:extLst>
+              <a:ext uri="{28A0092B-C50C-407E-A947-70E740481C1C}">
+                <a14:useLocalDpi xmlns:a14="http://schemas.microsoft.com/office/drawing/2010/main" val="0"/>
+              </a:ext>
+            </a:extLst>
+          </a:blip>
+          <a:stretch>
+            <a:fillRect/>
+          </a:stretch>
+        </p:blipFill>
+        <p:spPr>
+          <a:xfrm>
+            <a:off x="458807" y="1841561"/>
+            <a:ext cx="10726935" cy="1876608"/>
+          </a:xfrm>
+        </p:spPr>
+      </p:pic>
+      <p:pic>
+        <p:nvPicPr>
+          <p:cNvPr id="5" name="Image 4"/>
+          <p:cNvPicPr>
+            <a:picLocks noChangeAspect="1"/>
+          </p:cNvPicPr>
+          <p:nvPr/>
+        </p:nvPicPr>
+        <p:blipFill>
+          <a:blip r:embed="rId3">
+            <a:extLst>
+              <a:ext uri="{28A0092B-C50C-407E-A947-70E740481C1C}">
+                <a14:useLocalDpi xmlns:a14="http://schemas.microsoft.com/office/drawing/2010/main" val="0"/>
+              </a:ext>
+            </a:extLst>
+          </a:blip>
+          <a:stretch>
+            <a:fillRect/>
+          </a:stretch>
+        </p:blipFill>
+        <p:spPr>
+          <a:xfrm>
+            <a:off x="458806" y="3718169"/>
+            <a:ext cx="10719111" cy="2344428"/>
+          </a:xfrm>
+          <a:prstGeom prst="rect">
+            <a:avLst/>
+          </a:prstGeom>
+        </p:spPr>
+      </p:pic>
     </p:spTree>
     <p:extLst>
       <p:ext uri="{BB962C8B-B14F-4D97-AF65-F5344CB8AC3E}">
-        <p14:creationId xmlns:p14="http://schemas.microsoft.com/office/powerpoint/2010/main" val="3629476720"/>
+        <p14:creationId xmlns:p14="http://schemas.microsoft.com/office/powerpoint/2010/main" val="3611660347"/>
       </p:ext>
     </p:extLst>
   </p:cSld>
   <p:clrMapOvr>
     <a:masterClrMapping/>
   </p:clrMapOvr>
+  <p:timing>
+    <p:tnLst>
+      <p:par>
+        <p:cTn id="1" dur="indefinite" restart="never" nodeType="tmRoot"/>
+      </p:par>
+    </p:tnLst>
+  </p:timing>
 </p:sld>
 </file>
 
@@ -12815,7 +13062,7 @@
           <a:p>
             <a:r>
               <a:rPr lang="fr-CH" dirty="0" smtClean="0"/>
-              <a:t>Nouvelles connaissances ?</a:t>
+              <a:t>Fiertés et complications</a:t>
             </a:r>
             <a:endParaRPr lang="fr-CH" dirty="0"/>
           </a:p>
@@ -12823,7 +13070,7 @@
       </p:sp>
       <p:sp>
         <p:nvSpPr>
-          <p:cNvPr id="3" name="Espace réservé du contenu 2"/>
+          <p:cNvPr id="7" name="Espace réservé du contenu 6"/>
           <p:cNvSpPr>
             <a:spLocks noGrp="1"/>
           </p:cNvSpPr>
@@ -12840,20 +13087,189 @@
           </a:p>
         </p:txBody>
       </p:sp>
+      <p:pic>
+        <p:nvPicPr>
+          <p:cNvPr id="8" name="Espace réservé du contenu 3"/>
+          <p:cNvPicPr>
+            <a:picLocks noChangeAspect="1"/>
+          </p:cNvPicPr>
+          <p:nvPr/>
+        </p:nvPicPr>
+        <p:blipFill>
+          <a:blip r:embed="rId2">
+            <a:extLst>
+              <a:ext uri="{28A0092B-C50C-407E-A947-70E740481C1C}">
+                <a14:useLocalDpi xmlns:a14="http://schemas.microsoft.com/office/drawing/2010/main" val="0"/>
+              </a:ext>
+            </a:extLst>
+          </a:blip>
+          <a:stretch>
+            <a:fillRect/>
+          </a:stretch>
+        </p:blipFill>
+        <p:spPr>
+          <a:xfrm>
+            <a:off x="320920" y="1936335"/>
+            <a:ext cx="11752097" cy="4476990"/>
+          </a:xfrm>
+          <a:prstGeom prst="rect">
+            <a:avLst/>
+          </a:prstGeom>
+        </p:spPr>
+      </p:pic>
     </p:spTree>
     <p:extLst>
       <p:ext uri="{BB962C8B-B14F-4D97-AF65-F5344CB8AC3E}">
-        <p14:creationId xmlns:p14="http://schemas.microsoft.com/office/powerpoint/2010/main" val="977444898"/>
+        <p14:creationId xmlns:p14="http://schemas.microsoft.com/office/powerpoint/2010/main" val="3629476720"/>
       </p:ext>
     </p:extLst>
   </p:cSld>
   <p:clrMapOvr>
     <a:masterClrMapping/>
   </p:clrMapOvr>
+  <p:timing>
+    <p:tnLst>
+      <p:par>
+        <p:cTn id="1" dur="indefinite" restart="never" nodeType="tmRoot"/>
+      </p:par>
+    </p:tnLst>
+  </p:timing>
 </p:sld>
 </file>
 
 <file path=ppt/slides/slide7.xml><?xml version="1.0" encoding="utf-8"?>
+<p:sld xmlns:a="http://schemas.openxmlformats.org/drawingml/2006/main" xmlns:r="http://schemas.openxmlformats.org/officeDocument/2006/relationships" xmlns:p="http://schemas.openxmlformats.org/presentationml/2006/main">
+  <p:cSld>
+    <p:spTree>
+      <p:nvGrpSpPr>
+        <p:cNvPr id="1" name=""/>
+        <p:cNvGrpSpPr/>
+        <p:nvPr/>
+      </p:nvGrpSpPr>
+      <p:grpSpPr>
+        <a:xfrm>
+          <a:off x="0" y="0"/>
+          <a:ext cx="0" cy="0"/>
+          <a:chOff x="0" y="0"/>
+          <a:chExt cx="0" cy="0"/>
+        </a:xfrm>
+      </p:grpSpPr>
+      <p:pic>
+        <p:nvPicPr>
+          <p:cNvPr id="8" name="Espace réservé du contenu 3"/>
+          <p:cNvPicPr>
+            <a:picLocks noGrp="1" noChangeAspect="1"/>
+          </p:cNvPicPr>
+          <p:nvPr>
+            <p:ph idx="1"/>
+          </p:nvPr>
+        </p:nvPicPr>
+        <p:blipFill>
+          <a:blip r:embed="rId2">
+            <a:extLst>
+              <a:ext uri="{28A0092B-C50C-407E-A947-70E740481C1C}">
+                <a14:useLocalDpi xmlns:a14="http://schemas.microsoft.com/office/drawing/2010/main" val="0"/>
+              </a:ext>
+            </a:extLst>
+          </a:blip>
+          <a:stretch>
+            <a:fillRect/>
+          </a:stretch>
+        </p:blipFill>
+        <p:spPr>
+          <a:xfrm>
+            <a:off x="2049067" y="137785"/>
+            <a:ext cx="7595973" cy="6630689"/>
+          </a:xfrm>
+        </p:spPr>
+      </p:pic>
+    </p:spTree>
+    <p:extLst>
+      <p:ext uri="{BB962C8B-B14F-4D97-AF65-F5344CB8AC3E}">
+        <p14:creationId xmlns:p14="http://schemas.microsoft.com/office/powerpoint/2010/main" val="102951827"/>
+      </p:ext>
+    </p:extLst>
+  </p:cSld>
+  <p:clrMapOvr>
+    <a:masterClrMapping/>
+  </p:clrMapOvr>
+  <p:timing>
+    <p:tnLst>
+      <p:par>
+        <p:cTn id="1" dur="indefinite" restart="never" nodeType="tmRoot"/>
+      </p:par>
+    </p:tnLst>
+  </p:timing>
+</p:sld>
+</file>
+
+<file path=ppt/slides/slide8.xml><?xml version="1.0" encoding="utf-8"?>
+<p:sld xmlns:a="http://schemas.openxmlformats.org/drawingml/2006/main" xmlns:r="http://schemas.openxmlformats.org/officeDocument/2006/relationships" xmlns:p="http://schemas.openxmlformats.org/presentationml/2006/main">
+  <p:cSld>
+    <p:spTree>
+      <p:nvGrpSpPr>
+        <p:cNvPr id="1" name=""/>
+        <p:cNvGrpSpPr/>
+        <p:nvPr/>
+      </p:nvGrpSpPr>
+      <p:grpSpPr>
+        <a:xfrm>
+          <a:off x="0" y="0"/>
+          <a:ext cx="0" cy="0"/>
+          <a:chOff x="0" y="0"/>
+          <a:chExt cx="0" cy="0"/>
+        </a:xfrm>
+      </p:grpSpPr>
+      <p:pic>
+        <p:nvPicPr>
+          <p:cNvPr id="4" name="Espace réservé du contenu 3"/>
+          <p:cNvPicPr>
+            <a:picLocks noGrp="1" noChangeAspect="1"/>
+          </p:cNvPicPr>
+          <p:nvPr>
+            <p:ph idx="1"/>
+          </p:nvPr>
+        </p:nvPicPr>
+        <p:blipFill>
+          <a:blip r:embed="rId2">
+            <a:extLst>
+              <a:ext uri="{28A0092B-C50C-407E-A947-70E740481C1C}">
+                <a14:useLocalDpi xmlns:a14="http://schemas.microsoft.com/office/drawing/2010/main" val="0"/>
+              </a:ext>
+            </a:extLst>
+          </a:blip>
+          <a:stretch>
+            <a:fillRect/>
+          </a:stretch>
+        </p:blipFill>
+        <p:spPr>
+          <a:xfrm>
+            <a:off x="2041947" y="157640"/>
+            <a:ext cx="7953823" cy="6555737"/>
+          </a:xfrm>
+        </p:spPr>
+      </p:pic>
+    </p:spTree>
+    <p:extLst>
+      <p:ext uri="{BB962C8B-B14F-4D97-AF65-F5344CB8AC3E}">
+        <p14:creationId xmlns:p14="http://schemas.microsoft.com/office/powerpoint/2010/main" val="2805548786"/>
+      </p:ext>
+    </p:extLst>
+  </p:cSld>
+  <p:clrMapOvr>
+    <a:masterClrMapping/>
+  </p:clrMapOvr>
+  <p:timing>
+    <p:tnLst>
+      <p:par>
+        <p:cTn id="1" dur="indefinite" restart="never" nodeType="tmRoot"/>
+      </p:par>
+    </p:tnLst>
+  </p:timing>
+</p:sld>
+</file>
+
+<file path=ppt/slides/slide9.xml><?xml version="1.0" encoding="utf-8"?>
 <p:sld xmlns:a="http://schemas.openxmlformats.org/drawingml/2006/main" xmlns:r="http://schemas.openxmlformats.org/officeDocument/2006/relationships" xmlns:p="http://schemas.openxmlformats.org/presentationml/2006/main">
   <p:cSld>
     <p:spTree>
@@ -12885,10 +13301,9 @@
           <a:bodyPr/>
           <a:lstStyle/>
           <a:p>
-            <a:pPr algn="ctr"/>
             <a:r>
               <a:rPr lang="fr-CH" dirty="0" smtClean="0"/>
-              <a:t>QUESIONS ? </a:t>
+              <a:t>Nouvelles connaissances ?</a:t>
             </a:r>
             <a:endParaRPr lang="fr-CH" dirty="0"/>
           </a:p>
@@ -12896,83 +13311,40 @@
       </p:sp>
       <p:sp>
         <p:nvSpPr>
-          <p:cNvPr id="4" name="AutoShape 2" descr="Image result for questions png"/>
+          <p:cNvPr id="3" name="Espace réservé du contenu 2"/>
           <p:cNvSpPr>
-            <a:spLocks noChangeAspect="1" noChangeArrowheads="1"/>
+            <a:spLocks noGrp="1"/>
           </p:cNvSpPr>
-          <p:nvPr/>
+          <p:nvPr>
+            <p:ph idx="1"/>
+          </p:nvPr>
         </p:nvSpPr>
-        <p:spPr bwMode="auto">
-          <a:xfrm>
-            <a:off x="155575" y="-144463"/>
-            <a:ext cx="304800" cy="304801"/>
-          </a:xfrm>
-          <a:prstGeom prst="rect">
-            <a:avLst/>
-          </a:prstGeom>
-          <a:noFill/>
-          <a:extLst>
-            <a:ext uri="{909E8E84-426E-40DD-AFC4-6F175D3DCCD1}">
-              <a14:hiddenFill xmlns:a14="http://schemas.microsoft.com/office/drawing/2010/main">
-                <a:solidFill>
-                  <a:srgbClr val="FFFFFF"/>
-                </a:solidFill>
-              </a14:hiddenFill>
-            </a:ext>
-          </a:extLst>
-        </p:spPr>
+        <p:spPr/>
         <p:txBody>
-          <a:bodyPr vert="horz" wrap="square" lIns="91440" tIns="45720" rIns="91440" bIns="45720" numCol="1" anchor="t" anchorCtr="0" compatLnSpc="1">
-            <a:prstTxWarp prst="textNoShape">
-              <a:avLst/>
-            </a:prstTxWarp>
-          </a:bodyPr>
+          <a:bodyPr/>
           <a:lstStyle/>
           <a:p>
             <a:endParaRPr lang="fr-CH"/>
           </a:p>
         </p:txBody>
       </p:sp>
-      <p:pic>
-        <p:nvPicPr>
-          <p:cNvPr id="6" name="Image 5"/>
-          <p:cNvPicPr>
-            <a:picLocks noChangeAspect="1"/>
-          </p:cNvPicPr>
-          <p:nvPr/>
-        </p:nvPicPr>
-        <p:blipFill>
-          <a:blip r:embed="rId2">
-            <a:extLst>
-              <a:ext uri="{28A0092B-C50C-407E-A947-70E740481C1C}">
-                <a14:useLocalDpi xmlns:a14="http://schemas.microsoft.com/office/drawing/2010/main" val="0"/>
-              </a:ext>
-            </a:extLst>
-          </a:blip>
-          <a:stretch>
-            <a:fillRect/>
-          </a:stretch>
-        </p:blipFill>
-        <p:spPr>
-          <a:xfrm>
-            <a:off x="3710491" y="2236124"/>
-            <a:ext cx="4767842" cy="2907221"/>
-          </a:xfrm>
-          <a:prstGeom prst="rect">
-            <a:avLst/>
-          </a:prstGeom>
-        </p:spPr>
-      </p:pic>
     </p:spTree>
     <p:extLst>
       <p:ext uri="{BB962C8B-B14F-4D97-AF65-F5344CB8AC3E}">
-        <p14:creationId xmlns:p14="http://schemas.microsoft.com/office/powerpoint/2010/main" val="3823780413"/>
+        <p14:creationId xmlns:p14="http://schemas.microsoft.com/office/powerpoint/2010/main" val="977444898"/>
       </p:ext>
     </p:extLst>
   </p:cSld>
   <p:clrMapOvr>
     <a:masterClrMapping/>
   </p:clrMapOvr>
+  <p:timing>
+    <p:tnLst>
+      <p:par>
+        <p:cTn id="1" dur="indefinite" restart="never" nodeType="tmRoot"/>
+      </p:par>
+    </p:tnLst>
+  </p:timing>
 </p:sld>
 </file>
 

</xml_diff>